<commit_message>
Add Perl Examples,  Changed CSharp  and Node.js examples so they read input files from root data folder
</commit_message>
<xml_diff>
--- a/Data/sample-input.pptx
+++ b/Data/sample-input.pptx
@@ -1,15 +1,15 @@
 
 <file path=ppt/presentation.xml><?xml version="1.0" encoding="utf-8"?>
-<p:presentation xmlns:a="http://schemas.openxmlformats.org/drawingml/2006/main" xmlns:r="http://schemas.openxmlformats.org/officeDocument/2006/relationships" xmlns:p="http://schemas.openxmlformats.org/presentationml/2006/main" saveSubsetFonts="1">
+<!--Generated by Aspose.Slides for .NET 16.7.0.0-->
+<p:presentation xmlns:r="http://schemas.openxmlformats.org/officeDocument/2006/relationships" xmlns:a="http://schemas.openxmlformats.org/drawingml/2006/main" xmlns:p="http://schemas.openxmlformats.org/presentationml/2006/main" saveSubsetFonts="1">
   <p:sldMasterIdLst>
-    <p:sldMasterId id="2147483648" r:id="rId1"/>
-    <p:sldMasterId id="2147483660" r:id="rId2"/>
-    <p:sldMasterId id="2147483672" r:id="rId3"/>
+    <p:sldMasterId id="2147483648" r:id="rId2"/>
+    <p:sldMasterId id="2147483660" r:id="rId3"/>
+    <p:sldMasterId id="2147483672" r:id="rId4"/>
   </p:sldMasterIdLst>
   <p:sldIdLst>
-    <p:sldId id="256" r:id="rId4"/>
-    <p:sldId id="257" r:id="rId5"/>
-    <p:sldId id="258" r:id="rId6"/>
+    <p:sldId id="263" r:id="rId5"/>
+    <p:sldId id="265" r:id="rId6"/>
   </p:sldIdLst>
   <p:sldSz cx="9144000" cy="6858000" type="screen4x3"/>
   <p:notesSz cx="6858000" cy="9144000"/>
@@ -31,7 +31,7 @@
         <a:solidFill>
           <a:schemeClr val="tx1"/>
         </a:solidFill>
-        <a:latin typeface="Arial" charset="0"/>
+        <a:latin typeface="Arial"/>
         <a:ea typeface="+mn-ea"/>
         <a:cs typeface="+mn-cs"/>
       </a:defRPr>
@@ -47,7 +47,7 @@
         <a:solidFill>
           <a:schemeClr val="tx1"/>
         </a:solidFill>
-        <a:latin typeface="Arial" charset="0"/>
+        <a:latin typeface="Arial"/>
         <a:ea typeface="+mn-ea"/>
         <a:cs typeface="+mn-cs"/>
       </a:defRPr>
@@ -63,7 +63,7 @@
         <a:solidFill>
           <a:schemeClr val="tx1"/>
         </a:solidFill>
-        <a:latin typeface="Arial" charset="0"/>
+        <a:latin typeface="Arial"/>
         <a:ea typeface="+mn-ea"/>
         <a:cs typeface="+mn-cs"/>
       </a:defRPr>
@@ -79,7 +79,7 @@
         <a:solidFill>
           <a:schemeClr val="tx1"/>
         </a:solidFill>
-        <a:latin typeface="Arial" charset="0"/>
+        <a:latin typeface="Arial"/>
         <a:ea typeface="+mn-ea"/>
         <a:cs typeface="+mn-cs"/>
       </a:defRPr>
@@ -95,7 +95,7 @@
         <a:solidFill>
           <a:schemeClr val="tx1"/>
         </a:solidFill>
-        <a:latin typeface="Arial" charset="0"/>
+        <a:latin typeface="Arial"/>
         <a:ea typeface="+mn-ea"/>
         <a:cs typeface="+mn-cs"/>
       </a:defRPr>
@@ -105,7 +105,7 @@
         <a:solidFill>
           <a:schemeClr val="tx1"/>
         </a:solidFill>
-        <a:latin typeface="Arial" charset="0"/>
+        <a:latin typeface="Arial"/>
         <a:ea typeface="+mn-ea"/>
         <a:cs typeface="+mn-cs"/>
       </a:defRPr>
@@ -115,7 +115,7 @@
         <a:solidFill>
           <a:schemeClr val="tx1"/>
         </a:solidFill>
-        <a:latin typeface="Arial" charset="0"/>
+        <a:latin typeface="Arial"/>
         <a:ea typeface="+mn-ea"/>
         <a:cs typeface="+mn-cs"/>
       </a:defRPr>
@@ -125,7 +125,7 @@
         <a:solidFill>
           <a:schemeClr val="tx1"/>
         </a:solidFill>
-        <a:latin typeface="Arial" charset="0"/>
+        <a:latin typeface="Arial"/>
         <a:ea typeface="+mn-ea"/>
         <a:cs typeface="+mn-cs"/>
       </a:defRPr>
@@ -135,7 +135,7 @@
         <a:solidFill>
           <a:schemeClr val="tx1"/>
         </a:solidFill>
-        <a:latin typeface="Arial" charset="0"/>
+        <a:latin typeface="Arial"/>
         <a:ea typeface="+mn-ea"/>
         <a:cs typeface="+mn-cs"/>
       </a:defRPr>
@@ -145,22 +145,13 @@
 </file>
 
 <file path=ppt/commentAuthors.xml><?xml version="1.0" encoding="utf-8"?>
-<p:cmAuthorLst xmlns:a="http://schemas.openxmlformats.org/drawingml/2006/main" xmlns:r="http://schemas.openxmlformats.org/officeDocument/2006/relationships" xmlns:p="http://schemas.openxmlformats.org/presentationml/2006/main">
-  <p:cmAuthor id="0" name="Farooq Sheikh" initials="FS" lastIdx="1" clrIdx="0"/>
+<p:cmAuthorLst xmlns:p="http://schemas.openxmlformats.org/presentationml/2006/main">
+  <p:cmAuthor id="0" name="Farooq Sheikh" initials="FS" lastIdx="0" clrIdx="0"/>
 </p:cmAuthorLst>
 </file>
 
-<file path=ppt/comments/comment1.xml><?xml version="1.0" encoding="utf-8"?>
-<p:cmLst xmlns:a="http://schemas.openxmlformats.org/drawingml/2006/main" xmlns:r="http://schemas.openxmlformats.org/officeDocument/2006/relationships" xmlns:p="http://schemas.openxmlformats.org/presentationml/2006/main">
-  <p:cm authorId="0" dt="2015-07-03T16:33:23.640" idx="1">
-    <p:pos x="10" y="10"/>
-    <p:text>This is a test comment</p:text>
-  </p:cm>
-</p:cmLst>
-</file>
-
 <file path=ppt/slideLayouts/slideLayout1.xml><?xml version="1.0" encoding="utf-8"?>
-<p:sldLayout xmlns:a="http://schemas.openxmlformats.org/drawingml/2006/main" xmlns:r="http://schemas.openxmlformats.org/officeDocument/2006/relationships" xmlns:p="http://schemas.openxmlformats.org/presentationml/2006/main" type="title" preserve="1">
+<p:sldLayout xmlns:a="http://schemas.openxmlformats.org/drawingml/2006/main" xmlns:r="http://schemas.openxmlformats.org/officeDocument/2006/relationships" xmlns:p14="http://schemas.microsoft.com/office/powerpoint/2010/main" xmlns:p15="http://schemas.microsoft.com/office/powerpoint/2012/main" xmlns:p="http://schemas.openxmlformats.org/presentationml/2006/main" type="title" preserve="1">
   <p:cSld name="Title Slide">
     <p:spTree>
       <p:nvGrpSpPr>
@@ -172,8 +163,6 @@
         <a:xfrm>
           <a:off x="0" y="0"/>
           <a:ext cx="0" cy="0"/>
-          <a:chOff x="0" y="0"/>
-          <a:chExt cx="0" cy="0"/>
         </a:xfrm>
       </p:grpSpPr>
       <p:sp>
@@ -352,7 +341,6 @@
               </a:pPr>
               <a:t>10/12/2015</a:t>
             </a:fld>
-            <a:endParaRPr lang="en-US"/>
           </a:p>
         </p:txBody>
       </p:sp>
@@ -411,7 +399,6 @@
               </a:pPr>
               <a:t>‹#›</a:t>
             </a:fld>
-            <a:endParaRPr lang="en-US"/>
           </a:p>
         </p:txBody>
       </p:sp>
@@ -420,11 +407,13 @@
   <p:clrMapOvr>
     <a:masterClrMapping/>
   </p:clrMapOvr>
+  <p:transition/>
+  <p:timing/>
 </p:sldLayout>
 </file>
 
 <file path=ppt/slideLayouts/slideLayout10.xml><?xml version="1.0" encoding="utf-8"?>
-<p:sldLayout xmlns:a="http://schemas.openxmlformats.org/drawingml/2006/main" xmlns:r="http://schemas.openxmlformats.org/officeDocument/2006/relationships" xmlns:p="http://schemas.openxmlformats.org/presentationml/2006/main" type="vertTx" preserve="1">
+<p:sldLayout xmlns:a="http://schemas.openxmlformats.org/drawingml/2006/main" xmlns:r="http://schemas.openxmlformats.org/officeDocument/2006/relationships" xmlns:p14="http://schemas.microsoft.com/office/powerpoint/2010/main" xmlns:p15="http://schemas.microsoft.com/office/powerpoint/2012/main" xmlns:p="http://schemas.openxmlformats.org/presentationml/2006/main" type="vertTx" preserve="1">
   <p:cSld name="Title and Vertical Text">
     <p:spTree>
       <p:nvGrpSpPr>
@@ -436,8 +425,6 @@
         <a:xfrm>
           <a:off x="0" y="0"/>
           <a:ext cx="0" cy="0"/>
-          <a:chOff x="0" y="0"/>
-          <a:chExt cx="0" cy="0"/>
         </a:xfrm>
       </p:grpSpPr>
       <p:sp>
@@ -544,7 +531,6 @@
               </a:pPr>
               <a:t>10/12/2015</a:t>
             </a:fld>
-            <a:endParaRPr lang="en-US"/>
           </a:p>
         </p:txBody>
       </p:sp>
@@ -603,7 +589,6 @@
               </a:pPr>
               <a:t>‹#›</a:t>
             </a:fld>
-            <a:endParaRPr lang="en-US"/>
           </a:p>
         </p:txBody>
       </p:sp>
@@ -612,11 +597,13 @@
   <p:clrMapOvr>
     <a:masterClrMapping/>
   </p:clrMapOvr>
+  <p:transition/>
+  <p:timing/>
 </p:sldLayout>
 </file>
 
 <file path=ppt/slideLayouts/slideLayout11.xml><?xml version="1.0" encoding="utf-8"?>
-<p:sldLayout xmlns:a="http://schemas.openxmlformats.org/drawingml/2006/main" xmlns:r="http://schemas.openxmlformats.org/officeDocument/2006/relationships" xmlns:p="http://schemas.openxmlformats.org/presentationml/2006/main" type="vertTitleAndTx" preserve="1">
+<p:sldLayout xmlns:a="http://schemas.openxmlformats.org/drawingml/2006/main" xmlns:r="http://schemas.openxmlformats.org/officeDocument/2006/relationships" xmlns:p14="http://schemas.microsoft.com/office/powerpoint/2010/main" xmlns:p15="http://schemas.microsoft.com/office/powerpoint/2012/main" xmlns:p="http://schemas.openxmlformats.org/presentationml/2006/main" type="vertTitleAndTx" preserve="1">
   <p:cSld name="Vertical Title and Text">
     <p:spTree>
       <p:nvGrpSpPr>
@@ -628,8 +615,6 @@
         <a:xfrm>
           <a:off x="0" y="0"/>
           <a:ext cx="0" cy="0"/>
-          <a:chOff x="0" y="0"/>
-          <a:chExt cx="0" cy="0"/>
         </a:xfrm>
       </p:grpSpPr>
       <p:sp>
@@ -746,7 +731,6 @@
               </a:pPr>
               <a:t>10/12/2015</a:t>
             </a:fld>
-            <a:endParaRPr lang="en-US"/>
           </a:p>
         </p:txBody>
       </p:sp>
@@ -805,7 +789,6 @@
               </a:pPr>
               <a:t>‹#›</a:t>
             </a:fld>
-            <a:endParaRPr lang="en-US"/>
           </a:p>
         </p:txBody>
       </p:sp>
@@ -814,11 +797,13 @@
   <p:clrMapOvr>
     <a:masterClrMapping/>
   </p:clrMapOvr>
+  <p:transition/>
+  <p:timing/>
 </p:sldLayout>
 </file>
 
 <file path=ppt/slideLayouts/slideLayout12.xml><?xml version="1.0" encoding="utf-8"?>
-<p:sldLayout xmlns:a="http://schemas.openxmlformats.org/drawingml/2006/main" xmlns:r="http://schemas.openxmlformats.org/officeDocument/2006/relationships" xmlns:p="http://schemas.openxmlformats.org/presentationml/2006/main" type="title" preserve="1">
+<p:sldLayout xmlns:a="http://schemas.openxmlformats.org/drawingml/2006/main" xmlns:r="http://schemas.openxmlformats.org/officeDocument/2006/relationships" xmlns:p14="http://schemas.microsoft.com/office/powerpoint/2010/main" xmlns:p15="http://schemas.microsoft.com/office/powerpoint/2012/main" xmlns:p="http://schemas.openxmlformats.org/presentationml/2006/main" type="title" preserve="1">
   <p:cSld name="Title Slide">
     <p:spTree>
       <p:nvGrpSpPr>
@@ -830,8 +815,6 @@
         <a:xfrm>
           <a:off x="0" y="0"/>
           <a:ext cx="0" cy="0"/>
-          <a:chOff x="0" y="0"/>
-          <a:chExt cx="0" cy="0"/>
         </a:xfrm>
       </p:grpSpPr>
       <p:sp>
@@ -1010,7 +993,6 @@
               </a:pPr>
               <a:t>10/12/2015</a:t>
             </a:fld>
-            <a:endParaRPr lang="en-US"/>
           </a:p>
         </p:txBody>
       </p:sp>
@@ -1069,7 +1051,6 @@
               </a:pPr>
               <a:t>‹#›</a:t>
             </a:fld>
-            <a:endParaRPr lang="en-US"/>
           </a:p>
         </p:txBody>
       </p:sp>
@@ -1078,11 +1059,13 @@
   <p:clrMapOvr>
     <a:masterClrMapping/>
   </p:clrMapOvr>
+  <p:transition/>
+  <p:timing/>
 </p:sldLayout>
 </file>
 
 <file path=ppt/slideLayouts/slideLayout13.xml><?xml version="1.0" encoding="utf-8"?>
-<p:sldLayout xmlns:a="http://schemas.openxmlformats.org/drawingml/2006/main" xmlns:r="http://schemas.openxmlformats.org/officeDocument/2006/relationships" xmlns:p="http://schemas.openxmlformats.org/presentationml/2006/main" type="obj" preserve="1">
+<p:sldLayout xmlns:a="http://schemas.openxmlformats.org/drawingml/2006/main" xmlns:r="http://schemas.openxmlformats.org/officeDocument/2006/relationships" xmlns:p14="http://schemas.microsoft.com/office/powerpoint/2010/main" xmlns:p15="http://schemas.microsoft.com/office/powerpoint/2012/main" xmlns:p="http://schemas.openxmlformats.org/presentationml/2006/main" type="obj" preserve="1">
   <p:cSld name="Title and Content">
     <p:spTree>
       <p:nvGrpSpPr>
@@ -1094,8 +1077,6 @@
         <a:xfrm>
           <a:off x="0" y="0"/>
           <a:ext cx="0" cy="0"/>
-          <a:chOff x="0" y="0"/>
-          <a:chExt cx="0" cy="0"/>
         </a:xfrm>
       </p:grpSpPr>
       <p:sp>
@@ -1202,7 +1183,6 @@
               </a:pPr>
               <a:t>10/12/2015</a:t>
             </a:fld>
-            <a:endParaRPr lang="en-US"/>
           </a:p>
         </p:txBody>
       </p:sp>
@@ -1261,7 +1241,6 @@
               </a:pPr>
               <a:t>‹#›</a:t>
             </a:fld>
-            <a:endParaRPr lang="en-US"/>
           </a:p>
         </p:txBody>
       </p:sp>
@@ -1270,11 +1249,13 @@
   <p:clrMapOvr>
     <a:masterClrMapping/>
   </p:clrMapOvr>
+  <p:transition/>
+  <p:timing/>
 </p:sldLayout>
 </file>
 
 <file path=ppt/slideLayouts/slideLayout14.xml><?xml version="1.0" encoding="utf-8"?>
-<p:sldLayout xmlns:a="http://schemas.openxmlformats.org/drawingml/2006/main" xmlns:r="http://schemas.openxmlformats.org/officeDocument/2006/relationships" xmlns:p="http://schemas.openxmlformats.org/presentationml/2006/main" type="secHead" preserve="1">
+<p:sldLayout xmlns:a="http://schemas.openxmlformats.org/drawingml/2006/main" xmlns:r="http://schemas.openxmlformats.org/officeDocument/2006/relationships" xmlns:p14="http://schemas.microsoft.com/office/powerpoint/2010/main" xmlns:p15="http://schemas.microsoft.com/office/powerpoint/2012/main" xmlns:p="http://schemas.openxmlformats.org/presentationml/2006/main" type="secHead" preserve="1">
   <p:cSld name="Section Header">
     <p:spTree>
       <p:nvGrpSpPr>
@@ -1286,8 +1267,6 @@
         <a:xfrm>
           <a:off x="0" y="0"/>
           <a:ext cx="0" cy="0"/>
-          <a:chOff x="0" y="0"/>
-          <a:chExt cx="0" cy="0"/>
         </a:xfrm>
       </p:grpSpPr>
       <p:sp>
@@ -1470,7 +1449,6 @@
               </a:pPr>
               <a:t>10/12/2015</a:t>
             </a:fld>
-            <a:endParaRPr lang="en-US"/>
           </a:p>
         </p:txBody>
       </p:sp>
@@ -1529,7 +1507,6 @@
               </a:pPr>
               <a:t>‹#›</a:t>
             </a:fld>
-            <a:endParaRPr lang="en-US"/>
           </a:p>
         </p:txBody>
       </p:sp>
@@ -1538,11 +1515,13 @@
   <p:clrMapOvr>
     <a:masterClrMapping/>
   </p:clrMapOvr>
+  <p:transition/>
+  <p:timing/>
 </p:sldLayout>
 </file>
 
 <file path=ppt/slideLayouts/slideLayout15.xml><?xml version="1.0" encoding="utf-8"?>
-<p:sldLayout xmlns:a="http://schemas.openxmlformats.org/drawingml/2006/main" xmlns:r="http://schemas.openxmlformats.org/officeDocument/2006/relationships" xmlns:p="http://schemas.openxmlformats.org/presentationml/2006/main" type="twoObj" preserve="1">
+<p:sldLayout xmlns:a="http://schemas.openxmlformats.org/drawingml/2006/main" xmlns:r="http://schemas.openxmlformats.org/officeDocument/2006/relationships" xmlns:p14="http://schemas.microsoft.com/office/powerpoint/2010/main" xmlns:p15="http://schemas.microsoft.com/office/powerpoint/2012/main" xmlns:p="http://schemas.openxmlformats.org/presentationml/2006/main" type="twoObj" preserve="1">
   <p:cSld name="Two Content">
     <p:spTree>
       <p:nvGrpSpPr>
@@ -1554,8 +1533,6 @@
         <a:xfrm>
           <a:off x="0" y="0"/>
           <a:ext cx="0" cy="0"/>
-          <a:chOff x="0" y="0"/>
-          <a:chExt cx="0" cy="0"/>
         </a:xfrm>
       </p:grpSpPr>
       <p:sp>
@@ -1780,7 +1757,6 @@
               </a:pPr>
               <a:t>10/12/2015</a:t>
             </a:fld>
-            <a:endParaRPr lang="en-US"/>
           </a:p>
         </p:txBody>
       </p:sp>
@@ -1839,7 +1815,6 @@
               </a:pPr>
               <a:t>‹#›</a:t>
             </a:fld>
-            <a:endParaRPr lang="en-US"/>
           </a:p>
         </p:txBody>
       </p:sp>
@@ -1848,11 +1823,13 @@
   <p:clrMapOvr>
     <a:masterClrMapping/>
   </p:clrMapOvr>
+  <p:transition/>
+  <p:timing/>
 </p:sldLayout>
 </file>
 
 <file path=ppt/slideLayouts/slideLayout16.xml><?xml version="1.0" encoding="utf-8"?>
-<p:sldLayout xmlns:a="http://schemas.openxmlformats.org/drawingml/2006/main" xmlns:r="http://schemas.openxmlformats.org/officeDocument/2006/relationships" xmlns:p="http://schemas.openxmlformats.org/presentationml/2006/main" type="twoTxTwoObj" preserve="1">
+<p:sldLayout xmlns:a="http://schemas.openxmlformats.org/drawingml/2006/main" xmlns:r="http://schemas.openxmlformats.org/officeDocument/2006/relationships" xmlns:p14="http://schemas.microsoft.com/office/powerpoint/2010/main" xmlns:p15="http://schemas.microsoft.com/office/powerpoint/2012/main" xmlns:p="http://schemas.openxmlformats.org/presentationml/2006/main" type="twoTxTwoObj" preserve="1">
   <p:cSld name="Comparison">
     <p:spTree>
       <p:nvGrpSpPr>
@@ -1864,8 +1841,6 @@
         <a:xfrm>
           <a:off x="0" y="0"/>
           <a:ext cx="0" cy="0"/>
-          <a:chOff x="0" y="0"/>
-          <a:chExt cx="0" cy="0"/>
         </a:xfrm>
       </p:grpSpPr>
       <p:sp>
@@ -2224,7 +2199,6 @@
               </a:pPr>
               <a:t>10/12/2015</a:t>
             </a:fld>
-            <a:endParaRPr lang="en-US"/>
           </a:p>
         </p:txBody>
       </p:sp>
@@ -2283,7 +2257,6 @@
               </a:pPr>
               <a:t>‹#›</a:t>
             </a:fld>
-            <a:endParaRPr lang="en-US"/>
           </a:p>
         </p:txBody>
       </p:sp>
@@ -2292,11 +2265,13 @@
   <p:clrMapOvr>
     <a:masterClrMapping/>
   </p:clrMapOvr>
+  <p:transition/>
+  <p:timing/>
 </p:sldLayout>
 </file>
 
 <file path=ppt/slideLayouts/slideLayout17.xml><?xml version="1.0" encoding="utf-8"?>
-<p:sldLayout xmlns:a="http://schemas.openxmlformats.org/drawingml/2006/main" xmlns:r="http://schemas.openxmlformats.org/officeDocument/2006/relationships" xmlns:p="http://schemas.openxmlformats.org/presentationml/2006/main" type="titleOnly" preserve="1">
+<p:sldLayout xmlns:a="http://schemas.openxmlformats.org/drawingml/2006/main" xmlns:r="http://schemas.openxmlformats.org/officeDocument/2006/relationships" xmlns:p14="http://schemas.microsoft.com/office/powerpoint/2010/main" xmlns:p15="http://schemas.microsoft.com/office/powerpoint/2012/main" xmlns:p="http://schemas.openxmlformats.org/presentationml/2006/main" type="titleOnly" preserve="1">
   <p:cSld name="Title Only">
     <p:spTree>
       <p:nvGrpSpPr>
@@ -2308,8 +2283,6 @@
         <a:xfrm>
           <a:off x="0" y="0"/>
           <a:ext cx="0" cy="0"/>
-          <a:chOff x="0" y="0"/>
-          <a:chExt cx="0" cy="0"/>
         </a:xfrm>
       </p:grpSpPr>
       <p:sp>
@@ -2364,7 +2337,6 @@
               </a:pPr>
               <a:t>10/12/2015</a:t>
             </a:fld>
-            <a:endParaRPr lang="en-US"/>
           </a:p>
         </p:txBody>
       </p:sp>
@@ -2423,7 +2395,6 @@
               </a:pPr>
               <a:t>‹#›</a:t>
             </a:fld>
-            <a:endParaRPr lang="en-US"/>
           </a:p>
         </p:txBody>
       </p:sp>
@@ -2432,11 +2403,13 @@
   <p:clrMapOvr>
     <a:masterClrMapping/>
   </p:clrMapOvr>
+  <p:transition/>
+  <p:timing/>
 </p:sldLayout>
 </file>
 
 <file path=ppt/slideLayouts/slideLayout18.xml><?xml version="1.0" encoding="utf-8"?>
-<p:sldLayout xmlns:a="http://schemas.openxmlformats.org/drawingml/2006/main" xmlns:r="http://schemas.openxmlformats.org/officeDocument/2006/relationships" xmlns:p="http://schemas.openxmlformats.org/presentationml/2006/main" type="blank" preserve="1">
+<p:sldLayout xmlns:a="http://schemas.openxmlformats.org/drawingml/2006/main" xmlns:r="http://schemas.openxmlformats.org/officeDocument/2006/relationships" xmlns:p14="http://schemas.microsoft.com/office/powerpoint/2010/main" xmlns:p15="http://schemas.microsoft.com/office/powerpoint/2012/main" xmlns:p="http://schemas.openxmlformats.org/presentationml/2006/main" type="blank" preserve="1">
   <p:cSld name="Blank">
     <p:spTree>
       <p:nvGrpSpPr>
@@ -2448,8 +2421,6 @@
         <a:xfrm>
           <a:off x="0" y="0"/>
           <a:ext cx="0" cy="0"/>
-          <a:chOff x="0" y="0"/>
-          <a:chExt cx="0" cy="0"/>
         </a:xfrm>
       </p:grpSpPr>
       <p:sp>
@@ -2481,7 +2452,6 @@
               </a:pPr>
               <a:t>10/12/2015</a:t>
             </a:fld>
-            <a:endParaRPr lang="en-US"/>
           </a:p>
         </p:txBody>
       </p:sp>
@@ -2540,7 +2510,6 @@
               </a:pPr>
               <a:t>‹#›</a:t>
             </a:fld>
-            <a:endParaRPr lang="en-US"/>
           </a:p>
         </p:txBody>
       </p:sp>
@@ -2549,11 +2518,13 @@
   <p:clrMapOvr>
     <a:masterClrMapping/>
   </p:clrMapOvr>
+  <p:transition/>
+  <p:timing/>
 </p:sldLayout>
 </file>
 
 <file path=ppt/slideLayouts/slideLayout19.xml><?xml version="1.0" encoding="utf-8"?>
-<p:sldLayout xmlns:a="http://schemas.openxmlformats.org/drawingml/2006/main" xmlns:r="http://schemas.openxmlformats.org/officeDocument/2006/relationships" xmlns:p="http://schemas.openxmlformats.org/presentationml/2006/main" type="objTx" preserve="1">
+<p:sldLayout xmlns:a="http://schemas.openxmlformats.org/drawingml/2006/main" xmlns:r="http://schemas.openxmlformats.org/officeDocument/2006/relationships" xmlns:p14="http://schemas.microsoft.com/office/powerpoint/2010/main" xmlns:p15="http://schemas.microsoft.com/office/powerpoint/2012/main" xmlns:p="http://schemas.openxmlformats.org/presentationml/2006/main" type="objTx" preserve="1">
   <p:cSld name="Content with Caption">
     <p:spTree>
       <p:nvGrpSpPr>
@@ -2565,8 +2536,6 @@
         <a:xfrm>
           <a:off x="0" y="0"/>
           <a:ext cx="0" cy="0"/>
-          <a:chOff x="0" y="0"/>
-          <a:chExt cx="0" cy="0"/>
         </a:xfrm>
       </p:grpSpPr>
       <p:sp>
@@ -2780,7 +2749,6 @@
               </a:pPr>
               <a:t>10/12/2015</a:t>
             </a:fld>
-            <a:endParaRPr lang="en-US"/>
           </a:p>
         </p:txBody>
       </p:sp>
@@ -2839,7 +2807,6 @@
               </a:pPr>
               <a:t>‹#›</a:t>
             </a:fld>
-            <a:endParaRPr lang="en-US"/>
           </a:p>
         </p:txBody>
       </p:sp>
@@ -2848,11 +2815,13 @@
   <p:clrMapOvr>
     <a:masterClrMapping/>
   </p:clrMapOvr>
+  <p:transition/>
+  <p:timing/>
 </p:sldLayout>
 </file>
 
 <file path=ppt/slideLayouts/slideLayout2.xml><?xml version="1.0" encoding="utf-8"?>
-<p:sldLayout xmlns:a="http://schemas.openxmlformats.org/drawingml/2006/main" xmlns:r="http://schemas.openxmlformats.org/officeDocument/2006/relationships" xmlns:p="http://schemas.openxmlformats.org/presentationml/2006/main" type="obj" preserve="1">
+<p:sldLayout xmlns:a="http://schemas.openxmlformats.org/drawingml/2006/main" xmlns:r="http://schemas.openxmlformats.org/officeDocument/2006/relationships" xmlns:p14="http://schemas.microsoft.com/office/powerpoint/2010/main" xmlns:p15="http://schemas.microsoft.com/office/powerpoint/2012/main" xmlns:p="http://schemas.openxmlformats.org/presentationml/2006/main" type="obj" preserve="1">
   <p:cSld name="Title and Content">
     <p:spTree>
       <p:nvGrpSpPr>
@@ -2864,8 +2833,6 @@
         <a:xfrm>
           <a:off x="0" y="0"/>
           <a:ext cx="0" cy="0"/>
-          <a:chOff x="0" y="0"/>
-          <a:chExt cx="0" cy="0"/>
         </a:xfrm>
       </p:grpSpPr>
       <p:sp>
@@ -2972,7 +2939,6 @@
               </a:pPr>
               <a:t>10/12/2015</a:t>
             </a:fld>
-            <a:endParaRPr lang="en-US"/>
           </a:p>
         </p:txBody>
       </p:sp>
@@ -3031,7 +2997,6 @@
               </a:pPr>
               <a:t>‹#›</a:t>
             </a:fld>
-            <a:endParaRPr lang="en-US"/>
           </a:p>
         </p:txBody>
       </p:sp>
@@ -3040,11 +3005,13 @@
   <p:clrMapOvr>
     <a:masterClrMapping/>
   </p:clrMapOvr>
+  <p:transition/>
+  <p:timing/>
 </p:sldLayout>
 </file>
 
 <file path=ppt/slideLayouts/slideLayout20.xml><?xml version="1.0" encoding="utf-8"?>
-<p:sldLayout xmlns:a="http://schemas.openxmlformats.org/drawingml/2006/main" xmlns:r="http://schemas.openxmlformats.org/officeDocument/2006/relationships" xmlns:p="http://schemas.openxmlformats.org/presentationml/2006/main" type="picTx" preserve="1">
+<p:sldLayout xmlns:a="http://schemas.openxmlformats.org/drawingml/2006/main" xmlns:r="http://schemas.openxmlformats.org/officeDocument/2006/relationships" xmlns:p14="http://schemas.microsoft.com/office/powerpoint/2010/main" xmlns:p15="http://schemas.microsoft.com/office/powerpoint/2012/main" xmlns:p="http://schemas.openxmlformats.org/presentationml/2006/main" type="picTx" preserve="1">
   <p:cSld name="Picture with Caption">
     <p:spTree>
       <p:nvGrpSpPr>
@@ -3056,8 +3023,6 @@
         <a:xfrm>
           <a:off x="0" y="0"/>
           <a:ext cx="0" cy="0"/>
-          <a:chOff x="0" y="0"/>
-          <a:chExt cx="0" cy="0"/>
         </a:xfrm>
       </p:grpSpPr>
       <p:sp>
@@ -3250,7 +3215,6 @@
               </a:pPr>
               <a:t>10/12/2015</a:t>
             </a:fld>
-            <a:endParaRPr lang="en-US"/>
           </a:p>
         </p:txBody>
       </p:sp>
@@ -3309,7 +3273,6 @@
               </a:pPr>
               <a:t>‹#›</a:t>
             </a:fld>
-            <a:endParaRPr lang="en-US"/>
           </a:p>
         </p:txBody>
       </p:sp>
@@ -3318,11 +3281,13 @@
   <p:clrMapOvr>
     <a:masterClrMapping/>
   </p:clrMapOvr>
+  <p:transition/>
+  <p:timing/>
 </p:sldLayout>
 </file>
 
 <file path=ppt/slideLayouts/slideLayout21.xml><?xml version="1.0" encoding="utf-8"?>
-<p:sldLayout xmlns:a="http://schemas.openxmlformats.org/drawingml/2006/main" xmlns:r="http://schemas.openxmlformats.org/officeDocument/2006/relationships" xmlns:p="http://schemas.openxmlformats.org/presentationml/2006/main" type="vertTx" preserve="1">
+<p:sldLayout xmlns:a="http://schemas.openxmlformats.org/drawingml/2006/main" xmlns:r="http://schemas.openxmlformats.org/officeDocument/2006/relationships" xmlns:p14="http://schemas.microsoft.com/office/powerpoint/2010/main" xmlns:p15="http://schemas.microsoft.com/office/powerpoint/2012/main" xmlns:p="http://schemas.openxmlformats.org/presentationml/2006/main" type="vertTx" preserve="1">
   <p:cSld name="Title and Vertical Text">
     <p:spTree>
       <p:nvGrpSpPr>
@@ -3334,8 +3299,6 @@
         <a:xfrm>
           <a:off x="0" y="0"/>
           <a:ext cx="0" cy="0"/>
-          <a:chOff x="0" y="0"/>
-          <a:chExt cx="0" cy="0"/>
         </a:xfrm>
       </p:grpSpPr>
       <p:sp>
@@ -3442,7 +3405,6 @@
               </a:pPr>
               <a:t>10/12/2015</a:t>
             </a:fld>
-            <a:endParaRPr lang="en-US"/>
           </a:p>
         </p:txBody>
       </p:sp>
@@ -3501,7 +3463,6 @@
               </a:pPr>
               <a:t>‹#›</a:t>
             </a:fld>
-            <a:endParaRPr lang="en-US"/>
           </a:p>
         </p:txBody>
       </p:sp>
@@ -3510,11 +3471,13 @@
   <p:clrMapOvr>
     <a:masterClrMapping/>
   </p:clrMapOvr>
+  <p:transition/>
+  <p:timing/>
 </p:sldLayout>
 </file>
 
 <file path=ppt/slideLayouts/slideLayout22.xml><?xml version="1.0" encoding="utf-8"?>
-<p:sldLayout xmlns:a="http://schemas.openxmlformats.org/drawingml/2006/main" xmlns:r="http://schemas.openxmlformats.org/officeDocument/2006/relationships" xmlns:p="http://schemas.openxmlformats.org/presentationml/2006/main" type="vertTitleAndTx" preserve="1">
+<p:sldLayout xmlns:a="http://schemas.openxmlformats.org/drawingml/2006/main" xmlns:r="http://schemas.openxmlformats.org/officeDocument/2006/relationships" xmlns:p14="http://schemas.microsoft.com/office/powerpoint/2010/main" xmlns:p15="http://schemas.microsoft.com/office/powerpoint/2012/main" xmlns:p="http://schemas.openxmlformats.org/presentationml/2006/main" type="vertTitleAndTx" preserve="1">
   <p:cSld name="Vertical Title and Text">
     <p:spTree>
       <p:nvGrpSpPr>
@@ -3526,8 +3489,6 @@
         <a:xfrm>
           <a:off x="0" y="0"/>
           <a:ext cx="0" cy="0"/>
-          <a:chOff x="0" y="0"/>
-          <a:chExt cx="0" cy="0"/>
         </a:xfrm>
       </p:grpSpPr>
       <p:sp>
@@ -3644,7 +3605,6 @@
               </a:pPr>
               <a:t>10/12/2015</a:t>
             </a:fld>
-            <a:endParaRPr lang="en-US"/>
           </a:p>
         </p:txBody>
       </p:sp>
@@ -3703,7 +3663,6 @@
               </a:pPr>
               <a:t>‹#›</a:t>
             </a:fld>
-            <a:endParaRPr lang="en-US"/>
           </a:p>
         </p:txBody>
       </p:sp>
@@ -3712,11 +3671,13 @@
   <p:clrMapOvr>
     <a:masterClrMapping/>
   </p:clrMapOvr>
+  <p:transition/>
+  <p:timing/>
 </p:sldLayout>
 </file>
 
 <file path=ppt/slideLayouts/slideLayout23.xml><?xml version="1.0" encoding="utf-8"?>
-<p:sldLayout xmlns:a="http://schemas.openxmlformats.org/drawingml/2006/main" xmlns:r="http://schemas.openxmlformats.org/officeDocument/2006/relationships" xmlns:p="http://schemas.openxmlformats.org/presentationml/2006/main" type="title" preserve="1">
+<p:sldLayout xmlns:a="http://schemas.openxmlformats.org/drawingml/2006/main" xmlns:r="http://schemas.openxmlformats.org/officeDocument/2006/relationships" xmlns:p14="http://schemas.microsoft.com/office/powerpoint/2010/main" xmlns:p15="http://schemas.microsoft.com/office/powerpoint/2012/main" xmlns:p="http://schemas.openxmlformats.org/presentationml/2006/main" type="title" preserve="1">
   <p:cSld name="Title Slide">
     <p:spTree>
       <p:nvGrpSpPr>
@@ -3728,8 +3689,6 @@
         <a:xfrm>
           <a:off x="0" y="0"/>
           <a:ext cx="0" cy="0"/>
-          <a:chOff x="0" y="0"/>
-          <a:chExt cx="0" cy="0"/>
         </a:xfrm>
       </p:grpSpPr>
       <p:sp>
@@ -3908,7 +3867,6 @@
               </a:pPr>
               <a:t>10/12/2015</a:t>
             </a:fld>
-            <a:endParaRPr lang="en-US"/>
           </a:p>
         </p:txBody>
       </p:sp>
@@ -3967,7 +3925,6 @@
               </a:pPr>
               <a:t>‹#›</a:t>
             </a:fld>
-            <a:endParaRPr lang="en-US"/>
           </a:p>
         </p:txBody>
       </p:sp>
@@ -3976,11 +3933,13 @@
   <p:clrMapOvr>
     <a:masterClrMapping/>
   </p:clrMapOvr>
+  <p:transition/>
+  <p:timing/>
 </p:sldLayout>
 </file>
 
 <file path=ppt/slideLayouts/slideLayout24.xml><?xml version="1.0" encoding="utf-8"?>
-<p:sldLayout xmlns:a="http://schemas.openxmlformats.org/drawingml/2006/main" xmlns:r="http://schemas.openxmlformats.org/officeDocument/2006/relationships" xmlns:p="http://schemas.openxmlformats.org/presentationml/2006/main" type="obj" preserve="1">
+<p:sldLayout xmlns:a="http://schemas.openxmlformats.org/drawingml/2006/main" xmlns:r="http://schemas.openxmlformats.org/officeDocument/2006/relationships" xmlns:p14="http://schemas.microsoft.com/office/powerpoint/2010/main" xmlns:p15="http://schemas.microsoft.com/office/powerpoint/2012/main" xmlns:p="http://schemas.openxmlformats.org/presentationml/2006/main" type="obj" preserve="1">
   <p:cSld name="Title and Content">
     <p:spTree>
       <p:nvGrpSpPr>
@@ -3992,8 +3951,6 @@
         <a:xfrm>
           <a:off x="0" y="0"/>
           <a:ext cx="0" cy="0"/>
-          <a:chOff x="0" y="0"/>
-          <a:chExt cx="0" cy="0"/>
         </a:xfrm>
       </p:grpSpPr>
       <p:sp>
@@ -4100,7 +4057,6 @@
               </a:pPr>
               <a:t>10/12/2015</a:t>
             </a:fld>
-            <a:endParaRPr lang="en-US"/>
           </a:p>
         </p:txBody>
       </p:sp>
@@ -4159,7 +4115,6 @@
               </a:pPr>
               <a:t>‹#›</a:t>
             </a:fld>
-            <a:endParaRPr lang="en-US"/>
           </a:p>
         </p:txBody>
       </p:sp>
@@ -4168,11 +4123,13 @@
   <p:clrMapOvr>
     <a:masterClrMapping/>
   </p:clrMapOvr>
+  <p:transition/>
+  <p:timing/>
 </p:sldLayout>
 </file>
 
 <file path=ppt/slideLayouts/slideLayout25.xml><?xml version="1.0" encoding="utf-8"?>
-<p:sldLayout xmlns:a="http://schemas.openxmlformats.org/drawingml/2006/main" xmlns:r="http://schemas.openxmlformats.org/officeDocument/2006/relationships" xmlns:p="http://schemas.openxmlformats.org/presentationml/2006/main" type="secHead" preserve="1">
+<p:sldLayout xmlns:a="http://schemas.openxmlformats.org/drawingml/2006/main" xmlns:r="http://schemas.openxmlformats.org/officeDocument/2006/relationships" xmlns:p14="http://schemas.microsoft.com/office/powerpoint/2010/main" xmlns:p15="http://schemas.microsoft.com/office/powerpoint/2012/main" xmlns:p="http://schemas.openxmlformats.org/presentationml/2006/main" type="secHead" preserve="1">
   <p:cSld name="Section Header">
     <p:spTree>
       <p:nvGrpSpPr>
@@ -4184,8 +4141,6 @@
         <a:xfrm>
           <a:off x="0" y="0"/>
           <a:ext cx="0" cy="0"/>
-          <a:chOff x="0" y="0"/>
-          <a:chExt cx="0" cy="0"/>
         </a:xfrm>
       </p:grpSpPr>
       <p:sp>
@@ -4368,7 +4323,6 @@
               </a:pPr>
               <a:t>10/12/2015</a:t>
             </a:fld>
-            <a:endParaRPr lang="en-US"/>
           </a:p>
         </p:txBody>
       </p:sp>
@@ -4427,7 +4381,6 @@
               </a:pPr>
               <a:t>‹#›</a:t>
             </a:fld>
-            <a:endParaRPr lang="en-US"/>
           </a:p>
         </p:txBody>
       </p:sp>
@@ -4436,11 +4389,13 @@
   <p:clrMapOvr>
     <a:masterClrMapping/>
   </p:clrMapOvr>
+  <p:transition/>
+  <p:timing/>
 </p:sldLayout>
 </file>
 
 <file path=ppt/slideLayouts/slideLayout26.xml><?xml version="1.0" encoding="utf-8"?>
-<p:sldLayout xmlns:a="http://schemas.openxmlformats.org/drawingml/2006/main" xmlns:r="http://schemas.openxmlformats.org/officeDocument/2006/relationships" xmlns:p="http://schemas.openxmlformats.org/presentationml/2006/main" type="twoObj" preserve="1">
+<p:sldLayout xmlns:a="http://schemas.openxmlformats.org/drawingml/2006/main" xmlns:r="http://schemas.openxmlformats.org/officeDocument/2006/relationships" xmlns:p14="http://schemas.microsoft.com/office/powerpoint/2010/main" xmlns:p15="http://schemas.microsoft.com/office/powerpoint/2012/main" xmlns:p="http://schemas.openxmlformats.org/presentationml/2006/main" type="twoObj" preserve="1">
   <p:cSld name="Two Content">
     <p:spTree>
       <p:nvGrpSpPr>
@@ -4452,8 +4407,6 @@
         <a:xfrm>
           <a:off x="0" y="0"/>
           <a:ext cx="0" cy="0"/>
-          <a:chOff x="0" y="0"/>
-          <a:chExt cx="0" cy="0"/>
         </a:xfrm>
       </p:grpSpPr>
       <p:sp>
@@ -4678,7 +4631,6 @@
               </a:pPr>
               <a:t>10/12/2015</a:t>
             </a:fld>
-            <a:endParaRPr lang="en-US"/>
           </a:p>
         </p:txBody>
       </p:sp>
@@ -4737,7 +4689,6 @@
               </a:pPr>
               <a:t>‹#›</a:t>
             </a:fld>
-            <a:endParaRPr lang="en-US"/>
           </a:p>
         </p:txBody>
       </p:sp>
@@ -4746,11 +4697,13 @@
   <p:clrMapOvr>
     <a:masterClrMapping/>
   </p:clrMapOvr>
+  <p:transition/>
+  <p:timing/>
 </p:sldLayout>
 </file>
 
 <file path=ppt/slideLayouts/slideLayout27.xml><?xml version="1.0" encoding="utf-8"?>
-<p:sldLayout xmlns:a="http://schemas.openxmlformats.org/drawingml/2006/main" xmlns:r="http://schemas.openxmlformats.org/officeDocument/2006/relationships" xmlns:p="http://schemas.openxmlformats.org/presentationml/2006/main" type="twoTxTwoObj" preserve="1">
+<p:sldLayout xmlns:a="http://schemas.openxmlformats.org/drawingml/2006/main" xmlns:r="http://schemas.openxmlformats.org/officeDocument/2006/relationships" xmlns:p14="http://schemas.microsoft.com/office/powerpoint/2010/main" xmlns:p15="http://schemas.microsoft.com/office/powerpoint/2012/main" xmlns:p="http://schemas.openxmlformats.org/presentationml/2006/main" type="twoTxTwoObj" preserve="1">
   <p:cSld name="Comparison">
     <p:spTree>
       <p:nvGrpSpPr>
@@ -4762,8 +4715,6 @@
         <a:xfrm>
           <a:off x="0" y="0"/>
           <a:ext cx="0" cy="0"/>
-          <a:chOff x="0" y="0"/>
-          <a:chExt cx="0" cy="0"/>
         </a:xfrm>
       </p:grpSpPr>
       <p:sp>
@@ -5122,7 +5073,6 @@
               </a:pPr>
               <a:t>10/12/2015</a:t>
             </a:fld>
-            <a:endParaRPr lang="en-US"/>
           </a:p>
         </p:txBody>
       </p:sp>
@@ -5181,7 +5131,6 @@
               </a:pPr>
               <a:t>‹#›</a:t>
             </a:fld>
-            <a:endParaRPr lang="en-US"/>
           </a:p>
         </p:txBody>
       </p:sp>
@@ -5190,11 +5139,13 @@
   <p:clrMapOvr>
     <a:masterClrMapping/>
   </p:clrMapOvr>
+  <p:transition/>
+  <p:timing/>
 </p:sldLayout>
 </file>
 
 <file path=ppt/slideLayouts/slideLayout28.xml><?xml version="1.0" encoding="utf-8"?>
-<p:sldLayout xmlns:a="http://schemas.openxmlformats.org/drawingml/2006/main" xmlns:r="http://schemas.openxmlformats.org/officeDocument/2006/relationships" xmlns:p="http://schemas.openxmlformats.org/presentationml/2006/main" type="titleOnly" preserve="1">
+<p:sldLayout xmlns:a="http://schemas.openxmlformats.org/drawingml/2006/main" xmlns:r="http://schemas.openxmlformats.org/officeDocument/2006/relationships" xmlns:p14="http://schemas.microsoft.com/office/powerpoint/2010/main" xmlns:p15="http://schemas.microsoft.com/office/powerpoint/2012/main" xmlns:p="http://schemas.openxmlformats.org/presentationml/2006/main" type="titleOnly" preserve="1">
   <p:cSld name="Title Only">
     <p:spTree>
       <p:nvGrpSpPr>
@@ -5206,8 +5157,6 @@
         <a:xfrm>
           <a:off x="0" y="0"/>
           <a:ext cx="0" cy="0"/>
-          <a:chOff x="0" y="0"/>
-          <a:chExt cx="0" cy="0"/>
         </a:xfrm>
       </p:grpSpPr>
       <p:sp>
@@ -5262,7 +5211,6 @@
               </a:pPr>
               <a:t>10/12/2015</a:t>
             </a:fld>
-            <a:endParaRPr lang="en-US"/>
           </a:p>
         </p:txBody>
       </p:sp>
@@ -5321,7 +5269,6 @@
               </a:pPr>
               <a:t>‹#›</a:t>
             </a:fld>
-            <a:endParaRPr lang="en-US"/>
           </a:p>
         </p:txBody>
       </p:sp>
@@ -5330,11 +5277,13 @@
   <p:clrMapOvr>
     <a:masterClrMapping/>
   </p:clrMapOvr>
+  <p:transition/>
+  <p:timing/>
 </p:sldLayout>
 </file>
 
 <file path=ppt/slideLayouts/slideLayout29.xml><?xml version="1.0" encoding="utf-8"?>
-<p:sldLayout xmlns:a="http://schemas.openxmlformats.org/drawingml/2006/main" xmlns:r="http://schemas.openxmlformats.org/officeDocument/2006/relationships" xmlns:p="http://schemas.openxmlformats.org/presentationml/2006/main" type="blank" preserve="1">
+<p:sldLayout xmlns:a="http://schemas.openxmlformats.org/drawingml/2006/main" xmlns:r="http://schemas.openxmlformats.org/officeDocument/2006/relationships" xmlns:p14="http://schemas.microsoft.com/office/powerpoint/2010/main" xmlns:p15="http://schemas.microsoft.com/office/powerpoint/2012/main" xmlns:p="http://schemas.openxmlformats.org/presentationml/2006/main" type="blank" preserve="1">
   <p:cSld name="Blank">
     <p:spTree>
       <p:nvGrpSpPr>
@@ -5346,8 +5295,6 @@
         <a:xfrm>
           <a:off x="0" y="0"/>
           <a:ext cx="0" cy="0"/>
-          <a:chOff x="0" y="0"/>
-          <a:chExt cx="0" cy="0"/>
         </a:xfrm>
       </p:grpSpPr>
       <p:sp>
@@ -5379,7 +5326,6 @@
               </a:pPr>
               <a:t>10/12/2015</a:t>
             </a:fld>
-            <a:endParaRPr lang="en-US"/>
           </a:p>
         </p:txBody>
       </p:sp>
@@ -5438,7 +5384,6 @@
               </a:pPr>
               <a:t>‹#›</a:t>
             </a:fld>
-            <a:endParaRPr lang="en-US"/>
           </a:p>
         </p:txBody>
       </p:sp>
@@ -5447,11 +5392,13 @@
   <p:clrMapOvr>
     <a:masterClrMapping/>
   </p:clrMapOvr>
+  <p:transition/>
+  <p:timing/>
 </p:sldLayout>
 </file>
 
 <file path=ppt/slideLayouts/slideLayout3.xml><?xml version="1.0" encoding="utf-8"?>
-<p:sldLayout xmlns:a="http://schemas.openxmlformats.org/drawingml/2006/main" xmlns:r="http://schemas.openxmlformats.org/officeDocument/2006/relationships" xmlns:p="http://schemas.openxmlformats.org/presentationml/2006/main" type="secHead" preserve="1">
+<p:sldLayout xmlns:a="http://schemas.openxmlformats.org/drawingml/2006/main" xmlns:r="http://schemas.openxmlformats.org/officeDocument/2006/relationships" xmlns:p14="http://schemas.microsoft.com/office/powerpoint/2010/main" xmlns:p15="http://schemas.microsoft.com/office/powerpoint/2012/main" xmlns:p="http://schemas.openxmlformats.org/presentationml/2006/main" type="secHead" preserve="1">
   <p:cSld name="Section Header">
     <p:spTree>
       <p:nvGrpSpPr>
@@ -5463,8 +5410,6 @@
         <a:xfrm>
           <a:off x="0" y="0"/>
           <a:ext cx="0" cy="0"/>
-          <a:chOff x="0" y="0"/>
-          <a:chExt cx="0" cy="0"/>
         </a:xfrm>
       </p:grpSpPr>
       <p:sp>
@@ -5647,7 +5592,6 @@
               </a:pPr>
               <a:t>10/12/2015</a:t>
             </a:fld>
-            <a:endParaRPr lang="en-US"/>
           </a:p>
         </p:txBody>
       </p:sp>
@@ -5706,7 +5650,6 @@
               </a:pPr>
               <a:t>‹#›</a:t>
             </a:fld>
-            <a:endParaRPr lang="en-US"/>
           </a:p>
         </p:txBody>
       </p:sp>
@@ -5715,11 +5658,13 @@
   <p:clrMapOvr>
     <a:masterClrMapping/>
   </p:clrMapOvr>
+  <p:transition/>
+  <p:timing/>
 </p:sldLayout>
 </file>
 
 <file path=ppt/slideLayouts/slideLayout30.xml><?xml version="1.0" encoding="utf-8"?>
-<p:sldLayout xmlns:a="http://schemas.openxmlformats.org/drawingml/2006/main" xmlns:r="http://schemas.openxmlformats.org/officeDocument/2006/relationships" xmlns:p="http://schemas.openxmlformats.org/presentationml/2006/main" type="objTx" preserve="1">
+<p:sldLayout xmlns:a="http://schemas.openxmlformats.org/drawingml/2006/main" xmlns:r="http://schemas.openxmlformats.org/officeDocument/2006/relationships" xmlns:p14="http://schemas.microsoft.com/office/powerpoint/2010/main" xmlns:p15="http://schemas.microsoft.com/office/powerpoint/2012/main" xmlns:p="http://schemas.openxmlformats.org/presentationml/2006/main" type="objTx" preserve="1">
   <p:cSld name="Content with Caption">
     <p:spTree>
       <p:nvGrpSpPr>
@@ -5731,8 +5676,6 @@
         <a:xfrm>
           <a:off x="0" y="0"/>
           <a:ext cx="0" cy="0"/>
-          <a:chOff x="0" y="0"/>
-          <a:chExt cx="0" cy="0"/>
         </a:xfrm>
       </p:grpSpPr>
       <p:sp>
@@ -5946,7 +5889,6 @@
               </a:pPr>
               <a:t>10/12/2015</a:t>
             </a:fld>
-            <a:endParaRPr lang="en-US"/>
           </a:p>
         </p:txBody>
       </p:sp>
@@ -6005,7 +5947,6 @@
               </a:pPr>
               <a:t>‹#›</a:t>
             </a:fld>
-            <a:endParaRPr lang="en-US"/>
           </a:p>
         </p:txBody>
       </p:sp>
@@ -6014,11 +5955,13 @@
   <p:clrMapOvr>
     <a:masterClrMapping/>
   </p:clrMapOvr>
+  <p:transition/>
+  <p:timing/>
 </p:sldLayout>
 </file>
 
 <file path=ppt/slideLayouts/slideLayout31.xml><?xml version="1.0" encoding="utf-8"?>
-<p:sldLayout xmlns:a="http://schemas.openxmlformats.org/drawingml/2006/main" xmlns:r="http://schemas.openxmlformats.org/officeDocument/2006/relationships" xmlns:p="http://schemas.openxmlformats.org/presentationml/2006/main" type="picTx" preserve="1">
+<p:sldLayout xmlns:a="http://schemas.openxmlformats.org/drawingml/2006/main" xmlns:r="http://schemas.openxmlformats.org/officeDocument/2006/relationships" xmlns:p14="http://schemas.microsoft.com/office/powerpoint/2010/main" xmlns:p15="http://schemas.microsoft.com/office/powerpoint/2012/main" xmlns:p="http://schemas.openxmlformats.org/presentationml/2006/main" type="picTx" preserve="1">
   <p:cSld name="Picture with Caption">
     <p:spTree>
       <p:nvGrpSpPr>
@@ -6030,8 +5973,6 @@
         <a:xfrm>
           <a:off x="0" y="0"/>
           <a:ext cx="0" cy="0"/>
-          <a:chOff x="0" y="0"/>
-          <a:chExt cx="0" cy="0"/>
         </a:xfrm>
       </p:grpSpPr>
       <p:sp>
@@ -6224,7 +6165,6 @@
               </a:pPr>
               <a:t>10/12/2015</a:t>
             </a:fld>
-            <a:endParaRPr lang="en-US"/>
           </a:p>
         </p:txBody>
       </p:sp>
@@ -6283,7 +6223,6 @@
               </a:pPr>
               <a:t>‹#›</a:t>
             </a:fld>
-            <a:endParaRPr lang="en-US"/>
           </a:p>
         </p:txBody>
       </p:sp>
@@ -6292,11 +6231,13 @@
   <p:clrMapOvr>
     <a:masterClrMapping/>
   </p:clrMapOvr>
+  <p:transition/>
+  <p:timing/>
 </p:sldLayout>
 </file>
 
 <file path=ppt/slideLayouts/slideLayout32.xml><?xml version="1.0" encoding="utf-8"?>
-<p:sldLayout xmlns:a="http://schemas.openxmlformats.org/drawingml/2006/main" xmlns:r="http://schemas.openxmlformats.org/officeDocument/2006/relationships" xmlns:p="http://schemas.openxmlformats.org/presentationml/2006/main" type="vertTx" preserve="1">
+<p:sldLayout xmlns:a="http://schemas.openxmlformats.org/drawingml/2006/main" xmlns:r="http://schemas.openxmlformats.org/officeDocument/2006/relationships" xmlns:p14="http://schemas.microsoft.com/office/powerpoint/2010/main" xmlns:p15="http://schemas.microsoft.com/office/powerpoint/2012/main" xmlns:p="http://schemas.openxmlformats.org/presentationml/2006/main" type="vertTx" preserve="1">
   <p:cSld name="Title and Vertical Text">
     <p:spTree>
       <p:nvGrpSpPr>
@@ -6308,8 +6249,6 @@
         <a:xfrm>
           <a:off x="0" y="0"/>
           <a:ext cx="0" cy="0"/>
-          <a:chOff x="0" y="0"/>
-          <a:chExt cx="0" cy="0"/>
         </a:xfrm>
       </p:grpSpPr>
       <p:sp>
@@ -6416,7 +6355,6 @@
               </a:pPr>
               <a:t>10/12/2015</a:t>
             </a:fld>
-            <a:endParaRPr lang="en-US"/>
           </a:p>
         </p:txBody>
       </p:sp>
@@ -6475,7 +6413,6 @@
               </a:pPr>
               <a:t>‹#›</a:t>
             </a:fld>
-            <a:endParaRPr lang="en-US"/>
           </a:p>
         </p:txBody>
       </p:sp>
@@ -6484,11 +6421,13 @@
   <p:clrMapOvr>
     <a:masterClrMapping/>
   </p:clrMapOvr>
+  <p:transition/>
+  <p:timing/>
 </p:sldLayout>
 </file>
 
 <file path=ppt/slideLayouts/slideLayout33.xml><?xml version="1.0" encoding="utf-8"?>
-<p:sldLayout xmlns:a="http://schemas.openxmlformats.org/drawingml/2006/main" xmlns:r="http://schemas.openxmlformats.org/officeDocument/2006/relationships" xmlns:p="http://schemas.openxmlformats.org/presentationml/2006/main" type="vertTitleAndTx" preserve="1">
+<p:sldLayout xmlns:a="http://schemas.openxmlformats.org/drawingml/2006/main" xmlns:r="http://schemas.openxmlformats.org/officeDocument/2006/relationships" xmlns:p14="http://schemas.microsoft.com/office/powerpoint/2010/main" xmlns:p15="http://schemas.microsoft.com/office/powerpoint/2012/main" xmlns:p="http://schemas.openxmlformats.org/presentationml/2006/main" type="vertTitleAndTx" preserve="1">
   <p:cSld name="Vertical Title and Text">
     <p:spTree>
       <p:nvGrpSpPr>
@@ -6500,8 +6439,6 @@
         <a:xfrm>
           <a:off x="0" y="0"/>
           <a:ext cx="0" cy="0"/>
-          <a:chOff x="0" y="0"/>
-          <a:chExt cx="0" cy="0"/>
         </a:xfrm>
       </p:grpSpPr>
       <p:sp>
@@ -6618,7 +6555,6 @@
               </a:pPr>
               <a:t>10/12/2015</a:t>
             </a:fld>
-            <a:endParaRPr lang="en-US"/>
           </a:p>
         </p:txBody>
       </p:sp>
@@ -6677,7 +6613,6 @@
               </a:pPr>
               <a:t>‹#›</a:t>
             </a:fld>
-            <a:endParaRPr lang="en-US"/>
           </a:p>
         </p:txBody>
       </p:sp>
@@ -6686,11 +6621,13 @@
   <p:clrMapOvr>
     <a:masterClrMapping/>
   </p:clrMapOvr>
+  <p:transition/>
+  <p:timing/>
 </p:sldLayout>
 </file>
 
 <file path=ppt/slideLayouts/slideLayout4.xml><?xml version="1.0" encoding="utf-8"?>
-<p:sldLayout xmlns:a="http://schemas.openxmlformats.org/drawingml/2006/main" xmlns:r="http://schemas.openxmlformats.org/officeDocument/2006/relationships" xmlns:p="http://schemas.openxmlformats.org/presentationml/2006/main" type="twoObj" preserve="1">
+<p:sldLayout xmlns:a="http://schemas.openxmlformats.org/drawingml/2006/main" xmlns:r="http://schemas.openxmlformats.org/officeDocument/2006/relationships" xmlns:p14="http://schemas.microsoft.com/office/powerpoint/2010/main" xmlns:p15="http://schemas.microsoft.com/office/powerpoint/2012/main" xmlns:p="http://schemas.openxmlformats.org/presentationml/2006/main" type="twoObj" preserve="1">
   <p:cSld name="Two Content">
     <p:spTree>
       <p:nvGrpSpPr>
@@ -6702,8 +6639,6 @@
         <a:xfrm>
           <a:off x="0" y="0"/>
           <a:ext cx="0" cy="0"/>
-          <a:chOff x="0" y="0"/>
-          <a:chExt cx="0" cy="0"/>
         </a:xfrm>
       </p:grpSpPr>
       <p:sp>
@@ -6928,7 +6863,6 @@
               </a:pPr>
               <a:t>10/12/2015</a:t>
             </a:fld>
-            <a:endParaRPr lang="en-US"/>
           </a:p>
         </p:txBody>
       </p:sp>
@@ -6987,7 +6921,6 @@
               </a:pPr>
               <a:t>‹#›</a:t>
             </a:fld>
-            <a:endParaRPr lang="en-US"/>
           </a:p>
         </p:txBody>
       </p:sp>
@@ -6996,11 +6929,13 @@
   <p:clrMapOvr>
     <a:masterClrMapping/>
   </p:clrMapOvr>
+  <p:transition/>
+  <p:timing/>
 </p:sldLayout>
 </file>
 
 <file path=ppt/slideLayouts/slideLayout5.xml><?xml version="1.0" encoding="utf-8"?>
-<p:sldLayout xmlns:a="http://schemas.openxmlformats.org/drawingml/2006/main" xmlns:r="http://schemas.openxmlformats.org/officeDocument/2006/relationships" xmlns:p="http://schemas.openxmlformats.org/presentationml/2006/main" type="twoTxTwoObj" preserve="1">
+<p:sldLayout xmlns:a="http://schemas.openxmlformats.org/drawingml/2006/main" xmlns:r="http://schemas.openxmlformats.org/officeDocument/2006/relationships" xmlns:p14="http://schemas.microsoft.com/office/powerpoint/2010/main" xmlns:p15="http://schemas.microsoft.com/office/powerpoint/2012/main" xmlns:p="http://schemas.openxmlformats.org/presentationml/2006/main" type="twoTxTwoObj" preserve="1">
   <p:cSld name="Comparison">
     <p:spTree>
       <p:nvGrpSpPr>
@@ -7012,8 +6947,6 @@
         <a:xfrm>
           <a:off x="0" y="0"/>
           <a:ext cx="0" cy="0"/>
-          <a:chOff x="0" y="0"/>
-          <a:chExt cx="0" cy="0"/>
         </a:xfrm>
       </p:grpSpPr>
       <p:sp>
@@ -7372,7 +7305,6 @@
               </a:pPr>
               <a:t>10/12/2015</a:t>
             </a:fld>
-            <a:endParaRPr lang="en-US"/>
           </a:p>
         </p:txBody>
       </p:sp>
@@ -7431,7 +7363,6 @@
               </a:pPr>
               <a:t>‹#›</a:t>
             </a:fld>
-            <a:endParaRPr lang="en-US"/>
           </a:p>
         </p:txBody>
       </p:sp>
@@ -7440,11 +7371,13 @@
   <p:clrMapOvr>
     <a:masterClrMapping/>
   </p:clrMapOvr>
+  <p:transition/>
+  <p:timing/>
 </p:sldLayout>
 </file>
 
 <file path=ppt/slideLayouts/slideLayout6.xml><?xml version="1.0" encoding="utf-8"?>
-<p:sldLayout xmlns:a="http://schemas.openxmlformats.org/drawingml/2006/main" xmlns:r="http://schemas.openxmlformats.org/officeDocument/2006/relationships" xmlns:p="http://schemas.openxmlformats.org/presentationml/2006/main" type="titleOnly" preserve="1">
+<p:sldLayout xmlns:a="http://schemas.openxmlformats.org/drawingml/2006/main" xmlns:r="http://schemas.openxmlformats.org/officeDocument/2006/relationships" xmlns:p14="http://schemas.microsoft.com/office/powerpoint/2010/main" xmlns:p15="http://schemas.microsoft.com/office/powerpoint/2012/main" xmlns:p="http://schemas.openxmlformats.org/presentationml/2006/main" type="titleOnly" preserve="1">
   <p:cSld name="Title Only">
     <p:spTree>
       <p:nvGrpSpPr>
@@ -7456,8 +7389,6 @@
         <a:xfrm>
           <a:off x="0" y="0"/>
           <a:ext cx="0" cy="0"/>
-          <a:chOff x="0" y="0"/>
-          <a:chExt cx="0" cy="0"/>
         </a:xfrm>
       </p:grpSpPr>
       <p:sp>
@@ -7512,7 +7443,6 @@
               </a:pPr>
               <a:t>10/12/2015</a:t>
             </a:fld>
-            <a:endParaRPr lang="en-US"/>
           </a:p>
         </p:txBody>
       </p:sp>
@@ -7571,7 +7501,6 @@
               </a:pPr>
               <a:t>‹#›</a:t>
             </a:fld>
-            <a:endParaRPr lang="en-US"/>
           </a:p>
         </p:txBody>
       </p:sp>
@@ -7580,11 +7509,13 @@
   <p:clrMapOvr>
     <a:masterClrMapping/>
   </p:clrMapOvr>
+  <p:transition/>
+  <p:timing/>
 </p:sldLayout>
 </file>
 
 <file path=ppt/slideLayouts/slideLayout7.xml><?xml version="1.0" encoding="utf-8"?>
-<p:sldLayout xmlns:a="http://schemas.openxmlformats.org/drawingml/2006/main" xmlns:r="http://schemas.openxmlformats.org/officeDocument/2006/relationships" xmlns:p="http://schemas.openxmlformats.org/presentationml/2006/main" type="blank" preserve="1">
+<p:sldLayout xmlns:a="http://schemas.openxmlformats.org/drawingml/2006/main" xmlns:r="http://schemas.openxmlformats.org/officeDocument/2006/relationships" xmlns:p14="http://schemas.microsoft.com/office/powerpoint/2010/main" xmlns:p15="http://schemas.microsoft.com/office/powerpoint/2012/main" xmlns:p="http://schemas.openxmlformats.org/presentationml/2006/main" type="blank" preserve="1">
   <p:cSld name="Blank">
     <p:spTree>
       <p:nvGrpSpPr>
@@ -7596,8 +7527,6 @@
         <a:xfrm>
           <a:off x="0" y="0"/>
           <a:ext cx="0" cy="0"/>
-          <a:chOff x="0" y="0"/>
-          <a:chExt cx="0" cy="0"/>
         </a:xfrm>
       </p:grpSpPr>
       <p:sp>
@@ -7629,7 +7558,6 @@
               </a:pPr>
               <a:t>10/12/2015</a:t>
             </a:fld>
-            <a:endParaRPr lang="en-US"/>
           </a:p>
         </p:txBody>
       </p:sp>
@@ -7688,7 +7616,6 @@
               </a:pPr>
               <a:t>‹#›</a:t>
             </a:fld>
-            <a:endParaRPr lang="en-US"/>
           </a:p>
         </p:txBody>
       </p:sp>
@@ -7697,11 +7624,13 @@
   <p:clrMapOvr>
     <a:masterClrMapping/>
   </p:clrMapOvr>
+  <p:transition/>
+  <p:timing/>
 </p:sldLayout>
 </file>
 
 <file path=ppt/slideLayouts/slideLayout8.xml><?xml version="1.0" encoding="utf-8"?>
-<p:sldLayout xmlns:a="http://schemas.openxmlformats.org/drawingml/2006/main" xmlns:r="http://schemas.openxmlformats.org/officeDocument/2006/relationships" xmlns:p="http://schemas.openxmlformats.org/presentationml/2006/main" type="objTx" preserve="1">
+<p:sldLayout xmlns:a="http://schemas.openxmlformats.org/drawingml/2006/main" xmlns:r="http://schemas.openxmlformats.org/officeDocument/2006/relationships" xmlns:p14="http://schemas.microsoft.com/office/powerpoint/2010/main" xmlns:p15="http://schemas.microsoft.com/office/powerpoint/2012/main" xmlns:p="http://schemas.openxmlformats.org/presentationml/2006/main" type="objTx" preserve="1">
   <p:cSld name="Content with Caption">
     <p:spTree>
       <p:nvGrpSpPr>
@@ -7713,8 +7642,6 @@
         <a:xfrm>
           <a:off x="0" y="0"/>
           <a:ext cx="0" cy="0"/>
-          <a:chOff x="0" y="0"/>
-          <a:chExt cx="0" cy="0"/>
         </a:xfrm>
       </p:grpSpPr>
       <p:sp>
@@ -7928,7 +7855,6 @@
               </a:pPr>
               <a:t>10/12/2015</a:t>
             </a:fld>
-            <a:endParaRPr lang="en-US"/>
           </a:p>
         </p:txBody>
       </p:sp>
@@ -7987,7 +7913,6 @@
               </a:pPr>
               <a:t>‹#›</a:t>
             </a:fld>
-            <a:endParaRPr lang="en-US"/>
           </a:p>
         </p:txBody>
       </p:sp>
@@ -7996,11 +7921,13 @@
   <p:clrMapOvr>
     <a:masterClrMapping/>
   </p:clrMapOvr>
+  <p:transition/>
+  <p:timing/>
 </p:sldLayout>
 </file>
 
 <file path=ppt/slideLayouts/slideLayout9.xml><?xml version="1.0" encoding="utf-8"?>
-<p:sldLayout xmlns:a="http://schemas.openxmlformats.org/drawingml/2006/main" xmlns:r="http://schemas.openxmlformats.org/officeDocument/2006/relationships" xmlns:p="http://schemas.openxmlformats.org/presentationml/2006/main" type="picTx" preserve="1">
+<p:sldLayout xmlns:a="http://schemas.openxmlformats.org/drawingml/2006/main" xmlns:r="http://schemas.openxmlformats.org/officeDocument/2006/relationships" xmlns:p14="http://schemas.microsoft.com/office/powerpoint/2010/main" xmlns:p15="http://schemas.microsoft.com/office/powerpoint/2012/main" xmlns:p="http://schemas.openxmlformats.org/presentationml/2006/main" type="picTx" preserve="1">
   <p:cSld name="Picture with Caption">
     <p:spTree>
       <p:nvGrpSpPr>
@@ -8012,8 +7939,6 @@
         <a:xfrm>
           <a:off x="0" y="0"/>
           <a:ext cx="0" cy="0"/>
-          <a:chOff x="0" y="0"/>
-          <a:chExt cx="0" cy="0"/>
         </a:xfrm>
       </p:grpSpPr>
       <p:sp>
@@ -8206,7 +8131,6 @@
               </a:pPr>
               <a:t>10/12/2015</a:t>
             </a:fld>
-            <a:endParaRPr lang="en-US"/>
           </a:p>
         </p:txBody>
       </p:sp>
@@ -8265,7 +8189,6 @@
               </a:pPr>
               <a:t>‹#›</a:t>
             </a:fld>
-            <a:endParaRPr lang="en-US"/>
           </a:p>
         </p:txBody>
       </p:sp>
@@ -8274,11 +8197,13 @@
   <p:clrMapOvr>
     <a:masterClrMapping/>
   </p:clrMapOvr>
+  <p:transition/>
+  <p:timing/>
 </p:sldLayout>
 </file>
 
 <file path=ppt/slideMasters/slideMaster1.xml><?xml version="1.0" encoding="utf-8"?>
-<p:sldMaster xmlns:a="http://schemas.openxmlformats.org/drawingml/2006/main" xmlns:r="http://schemas.openxmlformats.org/officeDocument/2006/relationships" xmlns:p="http://schemas.openxmlformats.org/presentationml/2006/main">
+<p:sldMaster xmlns:a="http://schemas.openxmlformats.org/drawingml/2006/main" xmlns:r="http://schemas.openxmlformats.org/officeDocument/2006/relationships" xmlns:p14="http://schemas.microsoft.com/office/powerpoint/2010/main" xmlns:p15="http://schemas.microsoft.com/office/powerpoint/2012/main" xmlns:p="http://schemas.openxmlformats.org/presentationml/2006/main">
   <p:cSld>
     <p:bg>
       <p:bgRef idx="1001">
@@ -8295,8 +8220,6 @@
         <a:xfrm>
           <a:off x="0" y="0"/>
           <a:ext cx="0" cy="0"/>
-          <a:chOff x="0" y="0"/>
-          <a:chExt cx="0" cy="0"/>
         </a:xfrm>
       </p:grpSpPr>
       <p:sp>
@@ -8321,8 +8244,6 @@
           <a:ln w="9525">
             <a:noFill/>
             <a:miter lim="800000"/>
-            <a:headEnd/>
-            <a:tailEnd/>
           </a:ln>
         </p:spPr>
         <p:txBody>
@@ -8363,8 +8284,6 @@
           <a:ln w="9525">
             <a:noFill/>
             <a:miter lim="800000"/>
-            <a:headEnd/>
-            <a:tailEnd/>
           </a:ln>
         </p:spPr>
         <p:txBody>
@@ -8435,10 +8354,10 @@
           <a:lstStyle>
             <a:lvl1pPr algn="l" fontAlgn="auto">
               <a:spcBef>
-                <a:spcPts val="0"/>
+                <a:spcPct val="0"/>
               </a:spcBef>
               <a:spcAft>
-                <a:spcPts val="0"/>
+                <a:spcPct val="0"/>
               </a:spcAft>
               <a:defRPr sz="1200">
                 <a:solidFill>
@@ -8461,7 +8380,6 @@
               </a:pPr>
               <a:t>10/12/2015</a:t>
             </a:fld>
-            <a:endParaRPr lang="en-US"/>
           </a:p>
         </p:txBody>
       </p:sp>
@@ -8489,10 +8407,10 @@
           <a:lstStyle>
             <a:lvl1pPr algn="ctr" fontAlgn="auto">
               <a:spcBef>
-                <a:spcPts val="0"/>
+                <a:spcPct val="0"/>
               </a:spcBef>
               <a:spcAft>
-                <a:spcPts val="0"/>
+                <a:spcPct val="0"/>
               </a:spcAft>
               <a:defRPr sz="1200">
                 <a:solidFill>
@@ -8536,10 +8454,10 @@
           <a:lstStyle>
             <a:lvl1pPr algn="r" fontAlgn="auto">
               <a:spcBef>
-                <a:spcPts val="0"/>
+                <a:spcPct val="0"/>
               </a:spcBef>
               <a:spcAft>
-                <a:spcPts val="0"/>
+                <a:spcPct val="0"/>
               </a:spcAft>
               <a:defRPr sz="1200">
                 <a:solidFill>
@@ -8562,7 +8480,6 @@
               </a:pPr>
               <a:t>‹#›</a:t>
             </a:fld>
-            <a:endParaRPr lang="en-US"/>
           </a:p>
         </p:txBody>
       </p:sp>
@@ -8582,13 +8499,8 @@
     <p:sldLayoutId id="2147483674" r:id="rId10"/>
     <p:sldLayoutId id="2147483673" r:id="rId11"/>
   </p:sldLayoutIdLst>
-  <p:timing>
-    <p:tnLst>
-      <p:par>
-        <p:cTn id="1" dur="indefinite" restart="never" nodeType="tmRoot"/>
-      </p:par>
-    </p:tnLst>
-  </p:timing>
+  <p:transition/>
+  <p:timing/>
   <p:txStyles>
     <p:titleStyle>
       <a:lvl1pPr algn="ctr" rtl="0" eaLnBrk="0" fontAlgn="base" hangingPunct="0">
@@ -8972,7 +8884,7 @@
 </file>
 
 <file path=ppt/slideMasters/slideMaster2.xml><?xml version="1.0" encoding="utf-8"?>
-<p:sldMaster xmlns:a="http://schemas.openxmlformats.org/drawingml/2006/main" xmlns:r="http://schemas.openxmlformats.org/officeDocument/2006/relationships" xmlns:p="http://schemas.openxmlformats.org/presentationml/2006/main">
+<p:sldMaster xmlns:a="http://schemas.openxmlformats.org/drawingml/2006/main" xmlns:r="http://schemas.openxmlformats.org/officeDocument/2006/relationships" xmlns:p14="http://schemas.microsoft.com/office/powerpoint/2010/main" xmlns:p15="http://schemas.microsoft.com/office/powerpoint/2012/main" xmlns:p="http://schemas.openxmlformats.org/presentationml/2006/main">
   <p:cSld>
     <p:bg>
       <p:bgRef idx="1001">
@@ -8989,8 +8901,6 @@
         <a:xfrm>
           <a:off x="0" y="0"/>
           <a:ext cx="0" cy="0"/>
-          <a:chOff x="0" y="0"/>
-          <a:chExt cx="0" cy="0"/>
         </a:xfrm>
       </p:grpSpPr>
       <p:sp>
@@ -9015,8 +8925,6 @@
           <a:ln w="9525">
             <a:noFill/>
             <a:miter lim="800000"/>
-            <a:headEnd/>
-            <a:tailEnd/>
           </a:ln>
         </p:spPr>
         <p:txBody>
@@ -9057,8 +8965,6 @@
           <a:ln w="9525">
             <a:noFill/>
             <a:miter lim="800000"/>
-            <a:headEnd/>
-            <a:tailEnd/>
           </a:ln>
         </p:spPr>
         <p:txBody>
@@ -9159,7 +9065,7 @@
                 <a:solidFill>
                   <a:schemeClr val="tx1"/>
                 </a:solidFill>
-                <a:latin typeface="Arial" charset="0"/>
+                <a:latin typeface="Arial"/>
                 <a:ea typeface="+mn-ea"/>
                 <a:cs typeface="+mn-cs"/>
               </a:defRPr>
@@ -9175,7 +9081,7 @@
                 <a:solidFill>
                   <a:schemeClr val="tx1"/>
                 </a:solidFill>
-                <a:latin typeface="Arial" charset="0"/>
+                <a:latin typeface="Arial"/>
                 <a:ea typeface="+mn-ea"/>
                 <a:cs typeface="+mn-cs"/>
               </a:defRPr>
@@ -9191,7 +9097,7 @@
                 <a:solidFill>
                   <a:schemeClr val="tx1"/>
                 </a:solidFill>
-                <a:latin typeface="Arial" charset="0"/>
+                <a:latin typeface="Arial"/>
                 <a:ea typeface="+mn-ea"/>
                 <a:cs typeface="+mn-cs"/>
               </a:defRPr>
@@ -9207,7 +9113,7 @@
                 <a:solidFill>
                   <a:schemeClr val="tx1"/>
                 </a:solidFill>
-                <a:latin typeface="Arial" charset="0"/>
+                <a:latin typeface="Arial"/>
                 <a:ea typeface="+mn-ea"/>
                 <a:cs typeface="+mn-cs"/>
               </a:defRPr>
@@ -9217,7 +9123,7 @@
                 <a:solidFill>
                   <a:schemeClr val="tx1"/>
                 </a:solidFill>
-                <a:latin typeface="Arial" charset="0"/>
+                <a:latin typeface="Arial"/>
                 <a:ea typeface="+mn-ea"/>
                 <a:cs typeface="+mn-cs"/>
               </a:defRPr>
@@ -9227,7 +9133,7 @@
                 <a:solidFill>
                   <a:schemeClr val="tx1"/>
                 </a:solidFill>
-                <a:latin typeface="Arial" charset="0"/>
+                <a:latin typeface="Arial"/>
                 <a:ea typeface="+mn-ea"/>
                 <a:cs typeface="+mn-cs"/>
               </a:defRPr>
@@ -9237,7 +9143,7 @@
                 <a:solidFill>
                   <a:schemeClr val="tx1"/>
                 </a:solidFill>
-                <a:latin typeface="Arial" charset="0"/>
+                <a:latin typeface="Arial"/>
                 <a:ea typeface="+mn-ea"/>
                 <a:cs typeface="+mn-cs"/>
               </a:defRPr>
@@ -9254,7 +9160,6 @@
               </a:pPr>
               <a:t>10/12/2015</a:t>
             </a:fld>
-            <a:endParaRPr lang="en-US"/>
           </a:p>
         </p:txBody>
       </p:sp>
@@ -9312,7 +9217,7 @@
                 <a:solidFill>
                   <a:schemeClr val="tx1"/>
                 </a:solidFill>
-                <a:latin typeface="Arial" charset="0"/>
+                <a:latin typeface="Arial"/>
                 <a:ea typeface="+mn-ea"/>
                 <a:cs typeface="+mn-cs"/>
               </a:defRPr>
@@ -9328,7 +9233,7 @@
                 <a:solidFill>
                   <a:schemeClr val="tx1"/>
                 </a:solidFill>
-                <a:latin typeface="Arial" charset="0"/>
+                <a:latin typeface="Arial"/>
                 <a:ea typeface="+mn-ea"/>
                 <a:cs typeface="+mn-cs"/>
               </a:defRPr>
@@ -9344,7 +9249,7 @@
                 <a:solidFill>
                   <a:schemeClr val="tx1"/>
                 </a:solidFill>
-                <a:latin typeface="Arial" charset="0"/>
+                <a:latin typeface="Arial"/>
                 <a:ea typeface="+mn-ea"/>
                 <a:cs typeface="+mn-cs"/>
               </a:defRPr>
@@ -9360,7 +9265,7 @@
                 <a:solidFill>
                   <a:schemeClr val="tx1"/>
                 </a:solidFill>
-                <a:latin typeface="Arial" charset="0"/>
+                <a:latin typeface="Arial"/>
                 <a:ea typeface="+mn-ea"/>
                 <a:cs typeface="+mn-cs"/>
               </a:defRPr>
@@ -9370,7 +9275,7 @@
                 <a:solidFill>
                   <a:schemeClr val="tx1"/>
                 </a:solidFill>
-                <a:latin typeface="Arial" charset="0"/>
+                <a:latin typeface="Arial"/>
                 <a:ea typeface="+mn-ea"/>
                 <a:cs typeface="+mn-cs"/>
               </a:defRPr>
@@ -9380,7 +9285,7 @@
                 <a:solidFill>
                   <a:schemeClr val="tx1"/>
                 </a:solidFill>
-                <a:latin typeface="Arial" charset="0"/>
+                <a:latin typeface="Arial"/>
                 <a:ea typeface="+mn-ea"/>
                 <a:cs typeface="+mn-cs"/>
               </a:defRPr>
@@ -9390,7 +9295,7 @@
                 <a:solidFill>
                   <a:schemeClr val="tx1"/>
                 </a:solidFill>
-                <a:latin typeface="Arial" charset="0"/>
+                <a:latin typeface="Arial"/>
                 <a:ea typeface="+mn-ea"/>
                 <a:cs typeface="+mn-cs"/>
               </a:defRPr>
@@ -9458,7 +9363,7 @@
                 <a:solidFill>
                   <a:schemeClr val="tx1"/>
                 </a:solidFill>
-                <a:latin typeface="Arial" charset="0"/>
+                <a:latin typeface="Arial"/>
                 <a:ea typeface="+mn-ea"/>
                 <a:cs typeface="+mn-cs"/>
               </a:defRPr>
@@ -9474,7 +9379,7 @@
                 <a:solidFill>
                   <a:schemeClr val="tx1"/>
                 </a:solidFill>
-                <a:latin typeface="Arial" charset="0"/>
+                <a:latin typeface="Arial"/>
                 <a:ea typeface="+mn-ea"/>
                 <a:cs typeface="+mn-cs"/>
               </a:defRPr>
@@ -9490,7 +9395,7 @@
                 <a:solidFill>
                   <a:schemeClr val="tx1"/>
                 </a:solidFill>
-                <a:latin typeface="Arial" charset="0"/>
+                <a:latin typeface="Arial"/>
                 <a:ea typeface="+mn-ea"/>
                 <a:cs typeface="+mn-cs"/>
               </a:defRPr>
@@ -9506,7 +9411,7 @@
                 <a:solidFill>
                   <a:schemeClr val="tx1"/>
                 </a:solidFill>
-                <a:latin typeface="Arial" charset="0"/>
+                <a:latin typeface="Arial"/>
                 <a:ea typeface="+mn-ea"/>
                 <a:cs typeface="+mn-cs"/>
               </a:defRPr>
@@ -9516,7 +9421,7 @@
                 <a:solidFill>
                   <a:schemeClr val="tx1"/>
                 </a:solidFill>
-                <a:latin typeface="Arial" charset="0"/>
+                <a:latin typeface="Arial"/>
                 <a:ea typeface="+mn-ea"/>
                 <a:cs typeface="+mn-cs"/>
               </a:defRPr>
@@ -9526,7 +9431,7 @@
                 <a:solidFill>
                   <a:schemeClr val="tx1"/>
                 </a:solidFill>
-                <a:latin typeface="Arial" charset="0"/>
+                <a:latin typeface="Arial"/>
                 <a:ea typeface="+mn-ea"/>
                 <a:cs typeface="+mn-cs"/>
               </a:defRPr>
@@ -9536,7 +9441,7 @@
                 <a:solidFill>
                   <a:schemeClr val="tx1"/>
                 </a:solidFill>
-                <a:latin typeface="Arial" charset="0"/>
+                <a:latin typeface="Arial"/>
                 <a:ea typeface="+mn-ea"/>
                 <a:cs typeface="+mn-cs"/>
               </a:defRPr>
@@ -9553,7 +9458,6 @@
               </a:pPr>
               <a:t>‹#›</a:t>
             </a:fld>
-            <a:endParaRPr lang="en-US"/>
           </a:p>
         </p:txBody>
       </p:sp>
@@ -9573,13 +9477,8 @@
     <p:sldLayoutId id="2147483685" r:id="rId10"/>
     <p:sldLayoutId id="2147483684" r:id="rId11"/>
   </p:sldLayoutIdLst>
-  <p:timing>
-    <p:tnLst>
-      <p:par>
-        <p:cTn id="1" dur="indefinite" restart="never" nodeType="tmRoot"/>
-      </p:par>
-    </p:tnLst>
-  </p:timing>
+  <p:transition/>
+  <p:timing/>
   <p:txStyles>
     <p:titleStyle>
       <a:lvl1pPr algn="ctr" rtl="0" eaLnBrk="0" fontAlgn="base" hangingPunct="0">
@@ -9963,7 +9862,7 @@
 </file>
 
 <file path=ppt/slideMasters/slideMaster3.xml><?xml version="1.0" encoding="utf-8"?>
-<p:sldMaster xmlns:a="http://schemas.openxmlformats.org/drawingml/2006/main" xmlns:r="http://schemas.openxmlformats.org/officeDocument/2006/relationships" xmlns:p="http://schemas.openxmlformats.org/presentationml/2006/main">
+<p:sldMaster xmlns:a="http://schemas.openxmlformats.org/drawingml/2006/main" xmlns:r="http://schemas.openxmlformats.org/officeDocument/2006/relationships" xmlns:p14="http://schemas.microsoft.com/office/powerpoint/2010/main" xmlns:p15="http://schemas.microsoft.com/office/powerpoint/2012/main" xmlns:p="http://schemas.openxmlformats.org/presentationml/2006/main">
   <p:cSld>
     <p:bg>
       <p:bgRef idx="1001">
@@ -9980,8 +9879,6 @@
         <a:xfrm>
           <a:off x="0" y="0"/>
           <a:ext cx="0" cy="0"/>
-          <a:chOff x="0" y="0"/>
-          <a:chExt cx="0" cy="0"/>
         </a:xfrm>
       </p:grpSpPr>
       <p:sp>
@@ -10006,8 +9903,6 @@
           <a:ln w="9525">
             <a:noFill/>
             <a:miter lim="800000"/>
-            <a:headEnd/>
-            <a:tailEnd/>
           </a:ln>
         </p:spPr>
         <p:txBody>
@@ -10048,8 +9943,6 @@
           <a:ln w="9525">
             <a:noFill/>
             <a:miter lim="800000"/>
-            <a:headEnd/>
-            <a:tailEnd/>
           </a:ln>
         </p:spPr>
         <p:txBody>
@@ -10123,10 +10016,10 @@
             </a:defPPr>
             <a:lvl1pPr marL="0" algn="l" defTabSz="914400" rtl="0" eaLnBrk="1" fontAlgn="auto" latinLnBrk="0" hangingPunct="1">
               <a:spcBef>
-                <a:spcPts val="0"/>
+                <a:spcPct val="0"/>
               </a:spcBef>
               <a:spcAft>
-                <a:spcPts val="0"/>
+                <a:spcPct val="0"/>
               </a:spcAft>
               <a:defRPr sz="1200" kern="1200">
                 <a:solidFill>
@@ -10221,7 +10114,6 @@
               </a:pPr>
               <a:t>10/12/2015</a:t>
             </a:fld>
-            <a:endParaRPr lang="en-US"/>
           </a:p>
         </p:txBody>
       </p:sp>
@@ -10252,10 +10144,10 @@
             </a:defPPr>
             <a:lvl1pPr marL="0" algn="ctr" defTabSz="914400" rtl="0" eaLnBrk="1" fontAlgn="auto" latinLnBrk="0" hangingPunct="1">
               <a:spcBef>
-                <a:spcPts val="0"/>
+                <a:spcPct val="0"/>
               </a:spcBef>
               <a:spcAft>
-                <a:spcPts val="0"/>
+                <a:spcPct val="0"/>
               </a:spcAft>
               <a:defRPr sz="1200" kern="1200">
                 <a:solidFill>
@@ -10374,10 +10266,10 @@
             </a:defPPr>
             <a:lvl1pPr marL="0" algn="r" defTabSz="914400" rtl="0" eaLnBrk="1" fontAlgn="auto" latinLnBrk="0" hangingPunct="1">
               <a:spcBef>
-                <a:spcPts val="0"/>
+                <a:spcPct val="0"/>
               </a:spcBef>
               <a:spcAft>
-                <a:spcPts val="0"/>
+                <a:spcPct val="0"/>
               </a:spcAft>
               <a:defRPr sz="1200" kern="1200">
                 <a:solidFill>
@@ -10472,7 +10364,6 @@
               </a:pPr>
               <a:t>‹#›</a:t>
             </a:fld>
-            <a:endParaRPr lang="en-US"/>
           </a:p>
         </p:txBody>
       </p:sp>
@@ -10492,13 +10383,8 @@
     <p:sldLayoutId id="2147483696" r:id="rId10"/>
     <p:sldLayoutId id="2147483695" r:id="rId11"/>
   </p:sldLayoutIdLst>
-  <p:timing>
-    <p:tnLst>
-      <p:par>
-        <p:cTn id="1" dur="indefinite" restart="never" nodeType="tmRoot"/>
-      </p:par>
-    </p:tnLst>
-  </p:timing>
+  <p:transition/>
+  <p:timing/>
   <p:txStyles>
     <p:titleStyle>
       <a:lvl1pPr algn="ctr" rtl="0" eaLnBrk="0" fontAlgn="base" hangingPunct="0">
@@ -10882,7 +10768,7 @@
 </file>
 
 <file path=ppt/slides/slide1.xml><?xml version="1.0" encoding="utf-8"?>
-<p:sld xmlns:a="http://schemas.openxmlformats.org/drawingml/2006/main" xmlns:r="http://schemas.openxmlformats.org/officeDocument/2006/relationships" xmlns:p="http://schemas.openxmlformats.org/presentationml/2006/main">
+<p:sld xmlns:a="http://schemas.openxmlformats.org/drawingml/2006/main" xmlns:r="http://schemas.openxmlformats.org/officeDocument/2006/relationships" xmlns:p14="http://schemas.microsoft.com/office/powerpoint/2010/main" xmlns:p15="http://schemas.microsoft.com/office/powerpoint/2012/main" xmlns:p="http://schemas.openxmlformats.org/presentationml/2006/main">
   <p:cSld>
     <p:spTree>
       <p:nvGrpSpPr>
@@ -10894,311 +10780,21 @@
         <a:xfrm>
           <a:off x="0" y="0"/>
           <a:ext cx="0" cy="0"/>
-          <a:chOff x="0" y="0"/>
-          <a:chExt cx="0" cy="0"/>
         </a:xfrm>
       </p:grpSpPr>
-      <p:sp>
-        <p:nvSpPr>
-          <p:cNvPr id="37889" name="Title 1"/>
-          <p:cNvSpPr>
-            <a:spLocks noGrp="1"/>
-          </p:cNvSpPr>
-          <p:nvPr>
-            <p:ph type="ctrTitle"/>
-          </p:nvPr>
-        </p:nvSpPr>
-        <p:spPr>
-          <a:xfrm>
-            <a:off x="685800" y="3276600"/>
-            <a:ext cx="7772400" cy="1470025"/>
-          </a:xfrm>
-        </p:spPr>
-        <p:txBody>
-          <a:bodyPr/>
-          <a:lstStyle/>
-          <a:p>
-            <a:pPr eaLnBrk="1" hangingPunct="1"/>
-            <a:r>
-              <a:rPr lang="en-US" b="1" smtClean="0">
-                <a:solidFill>
-                  <a:srgbClr val="FF0000"/>
-                </a:solidFill>
-              </a:rPr>
-              <a:t>Aspose.Slides for Java</a:t>
-            </a:r>
-          </a:p>
-        </p:txBody>
-      </p:sp>
-      <p:sp>
-        <p:nvSpPr>
-          <p:cNvPr id="3" name="Subtitle 2"/>
-          <p:cNvSpPr>
-            <a:spLocks noGrp="1"/>
-          </p:cNvSpPr>
-          <p:nvPr>
-            <p:ph type="subTitle" idx="1"/>
-          </p:nvPr>
-        </p:nvSpPr>
-        <p:spPr>
-          <a:xfrm>
-            <a:off x="1371600" y="4648200"/>
-            <a:ext cx="6400800" cy="1752600"/>
-          </a:xfrm>
-        </p:spPr>
-        <p:txBody>
-          <a:bodyPr rtlCol="0">
-            <a:normAutofit/>
-          </a:bodyPr>
-          <a:lstStyle/>
-          <a:p>
-            <a:pPr eaLnBrk="1" fontAlgn="auto" hangingPunct="1">
-              <a:spcAft>
-                <a:spcPts val="0"/>
-              </a:spcAft>
-              <a:buFont typeface="Arial" pitchFamily="34" charset="0"/>
-              <a:buNone/>
-              <a:defRPr/>
-            </a:pPr>
-            <a:r>
-              <a:rPr lang="en-US" smtClean="0"/>
-              <a:t>Sample Text</a:t>
-            </a:r>
-          </a:p>
-          <a:p>
-            <a:pPr eaLnBrk="1" fontAlgn="auto" hangingPunct="1">
-              <a:spcAft>
-                <a:spcPts val="0"/>
-              </a:spcAft>
-              <a:buFont typeface="Arial" pitchFamily="34" charset="0"/>
-              <a:buNone/>
-              <a:defRPr/>
-            </a:pPr>
-            <a:endParaRPr lang="en-US"/>
-          </a:p>
-        </p:txBody>
-      </p:sp>
-      <p:graphicFrame>
-        <p:nvGraphicFramePr>
-          <p:cNvPr id="4" name="Table 3"/>
-          <p:cNvGraphicFramePr>
-            <a:graphicFrameLocks noGrp="1"/>
-          </p:cNvGraphicFramePr>
-          <p:nvPr/>
-        </p:nvGraphicFramePr>
-        <p:xfrm>
-          <a:off x="1524000" y="1397000"/>
-          <a:ext cx="6096000" cy="1482725"/>
-        </p:xfrm>
-        <a:graphic>
-          <a:graphicData uri="http://schemas.openxmlformats.org/drawingml/2006/table">
-            <a:tbl>
-              <a:tblPr firstRow="1" bandRow="1">
-                <a:tableStyleId>{5C22544A-7EE6-4342-B048-85BDC9FD1C3A}</a:tableStyleId>
-              </a:tblPr>
-              <a:tblGrid>
-                <a:gridCol w="2032000"/>
-                <a:gridCol w="2032000"/>
-                <a:gridCol w="2032000"/>
-              </a:tblGrid>
-              <a:tr h="370840">
-                <a:tc>
-                  <a:txBody>
-                    <a:bodyPr/>
-                    <a:lstStyle/>
-                    <a:p>
-                      <a:r>
-                        <a:rPr lang="en-US" smtClean="0"/>
-                        <a:t>OrderID</a:t>
-                      </a:r>
-                      <a:endParaRPr lang="en-US"/>
-                    </a:p>
-                  </a:txBody>
-                  <a:tcPr/>
-                </a:tc>
-                <a:tc>
-                  <a:txBody>
-                    <a:bodyPr/>
-                    <a:lstStyle/>
-                    <a:p>
-                      <a:r>
-                        <a:rPr lang="en-US" smtClean="0"/>
-                        <a:t>Product</a:t>
-                      </a:r>
-                      <a:endParaRPr lang="en-US"/>
-                    </a:p>
-                  </a:txBody>
-                  <a:tcPr/>
-                </a:tc>
-                <a:tc>
-                  <a:txBody>
-                    <a:bodyPr/>
-                    <a:lstStyle/>
-                    <a:p>
-                      <a:r>
-                        <a:rPr lang="en-US" smtClean="0"/>
-                        <a:t>Price</a:t>
-                      </a:r>
-                      <a:endParaRPr lang="en-US"/>
-                    </a:p>
-                  </a:txBody>
-                  <a:tcPr/>
-                </a:tc>
-              </a:tr>
-              <a:tr h="370840">
-                <a:tc>
-                  <a:txBody>
-                    <a:bodyPr/>
-                    <a:lstStyle/>
-                    <a:p>
-                      <a:r>
-                        <a:rPr lang="en-US" smtClean="0"/>
-                        <a:t>1</a:t>
-                      </a:r>
-                      <a:endParaRPr lang="en-US"/>
-                    </a:p>
-                  </a:txBody>
-                  <a:tcPr/>
-                </a:tc>
-                <a:tc>
-                  <a:txBody>
-                    <a:bodyPr/>
-                    <a:lstStyle/>
-                    <a:p>
-                      <a:r>
-                        <a:rPr lang="en-US" smtClean="0"/>
-                        <a:t>ABC</a:t>
-                      </a:r>
-                      <a:endParaRPr lang="en-US"/>
-                    </a:p>
-                  </a:txBody>
-                  <a:tcPr/>
-                </a:tc>
-                <a:tc>
-                  <a:txBody>
-                    <a:bodyPr/>
-                    <a:lstStyle/>
-                    <a:p>
-                      <a:r>
-                        <a:rPr lang="en-US" smtClean="0"/>
-                        <a:t>300</a:t>
-                      </a:r>
-                      <a:endParaRPr lang="en-US"/>
-                    </a:p>
-                  </a:txBody>
-                  <a:tcPr/>
-                </a:tc>
-              </a:tr>
-              <a:tr h="370840">
-                <a:tc>
-                  <a:txBody>
-                    <a:bodyPr/>
-                    <a:lstStyle/>
-                    <a:p>
-                      <a:r>
-                        <a:rPr lang="en-US" smtClean="0"/>
-                        <a:t>2</a:t>
-                      </a:r>
-                      <a:endParaRPr lang="en-US"/>
-                    </a:p>
-                  </a:txBody>
-                  <a:tcPr/>
-                </a:tc>
-                <a:tc>
-                  <a:txBody>
-                    <a:bodyPr/>
-                    <a:lstStyle/>
-                    <a:p>
-                      <a:r>
-                        <a:rPr lang="en-US" smtClean="0"/>
-                        <a:t>XYZ</a:t>
-                      </a:r>
-                      <a:endParaRPr lang="en-US"/>
-                    </a:p>
-                  </a:txBody>
-                  <a:tcPr/>
-                </a:tc>
-                <a:tc>
-                  <a:txBody>
-                    <a:bodyPr/>
-                    <a:lstStyle/>
-                    <a:p>
-                      <a:r>
-                        <a:rPr lang="en-US" smtClean="0"/>
-                        <a:t>550</a:t>
-                      </a:r>
-                      <a:endParaRPr lang="en-US"/>
-                    </a:p>
-                  </a:txBody>
-                  <a:tcPr/>
-                </a:tc>
-              </a:tr>
-              <a:tr h="370840">
-                <a:tc>
-                  <a:txBody>
-                    <a:bodyPr/>
-                    <a:lstStyle/>
-                    <a:p>
-                      <a:r>
-                        <a:rPr lang="en-US" smtClean="0"/>
-                        <a:t>3</a:t>
-                      </a:r>
-                      <a:endParaRPr lang="en-US"/>
-                    </a:p>
-                  </a:txBody>
-                  <a:tcPr/>
-                </a:tc>
-                <a:tc>
-                  <a:txBody>
-                    <a:bodyPr/>
-                    <a:lstStyle/>
-                    <a:p>
-                      <a:r>
-                        <a:rPr lang="en-US" smtClean="0"/>
-                        <a:t>PQR</a:t>
-                      </a:r>
-                      <a:endParaRPr lang="en-US"/>
-                    </a:p>
-                  </a:txBody>
-                  <a:tcPr/>
-                </a:tc>
-                <a:tc>
-                  <a:txBody>
-                    <a:bodyPr/>
-                    <a:lstStyle/>
-                    <a:p>
-                      <a:r>
-                        <a:rPr lang="en-US" smtClean="0"/>
-                        <a:t>875</a:t>
-                      </a:r>
-                      <a:endParaRPr lang="en-US"/>
-                    </a:p>
-                  </a:txBody>
-                  <a:tcPr/>
-                </a:tc>
-              </a:tr>
-            </a:tbl>
-          </a:graphicData>
-        </a:graphic>
-      </p:graphicFrame>
     </p:spTree>
   </p:cSld>
   <p:clrMapOvr>
     <a:masterClrMapping/>
   </p:clrMapOvr>
-  <p:timing>
-    <p:tnLst>
-      <p:par>
-        <p:cTn id="1" dur="indefinite" restart="never" nodeType="tmRoot"/>
-      </p:par>
-    </p:tnLst>
-  </p:timing>
+  <p:transition/>
+  <p:timing/>
 </p:sld>
 </file>
 
 <file path=ppt/slides/slide2.xml><?xml version="1.0" encoding="utf-8"?>
-<p:sld xmlns:a="http://schemas.openxmlformats.org/drawingml/2006/main" xmlns:r="http://schemas.openxmlformats.org/officeDocument/2006/relationships" xmlns:p="http://schemas.openxmlformats.org/presentationml/2006/main">
-  <p:cSld>
+<p:sld xmlns:a="http://schemas.openxmlformats.org/drawingml/2006/main" xmlns:r="http://schemas.openxmlformats.org/officeDocument/2006/relationships" xmlns:p14="http://schemas.microsoft.com/office/powerpoint/2010/main" xmlns:p15="http://schemas.microsoft.com/office/powerpoint/2012/main" xmlns:p="http://schemas.openxmlformats.org/presentationml/2006/main">
+  <p:cSld name="">
     <p:spTree>
       <p:nvGrpSpPr>
         <p:cNvPr id="1" name=""/>
@@ -11209,578 +10805,30 @@
         <a:xfrm>
           <a:off x="0" y="0"/>
           <a:ext cx="0" cy="0"/>
-          <a:chOff x="0" y="0"/>
-          <a:chExt cx="0" cy="0"/>
         </a:xfrm>
       </p:grpSpPr>
-      <p:sp>
-        <p:nvSpPr>
-          <p:cNvPr id="38913" name="Title 1"/>
-          <p:cNvSpPr>
-            <a:spLocks noGrp="1"/>
-          </p:cNvSpPr>
-          <p:nvPr>
-            <p:ph type="ctrTitle" idx="4294967295"/>
-          </p:nvPr>
-        </p:nvSpPr>
-        <p:spPr>
-          <a:xfrm>
-            <a:off x="685800" y="2130425"/>
-            <a:ext cx="7772400" cy="1470025"/>
-          </a:xfrm>
-        </p:spPr>
-        <p:txBody>
-          <a:bodyPr/>
-          <a:lstStyle/>
-          <a:p>
-            <a:pPr eaLnBrk="1" hangingPunct="1"/>
-            <a:r>
-              <a:rPr lang="en-US" smtClean="0"/>
-              <a:t>Aspose Sample 2</a:t>
-            </a:r>
-          </a:p>
-        </p:txBody>
-      </p:sp>
-      <p:sp>
-        <p:nvSpPr>
-          <p:cNvPr id="38914" name="Subtitle 2"/>
-          <p:cNvSpPr>
-            <a:spLocks noGrp="1"/>
-          </p:cNvSpPr>
-          <p:nvPr>
-            <p:ph type="subTitle" idx="4294967295"/>
-          </p:nvPr>
-        </p:nvSpPr>
-        <p:spPr>
-          <a:xfrm>
-            <a:off x="1371600" y="3886200"/>
-            <a:ext cx="6400800" cy="1752600"/>
-          </a:xfrm>
-        </p:spPr>
-        <p:txBody>
-          <a:bodyPr/>
-          <a:lstStyle/>
-          <a:p>
-            <a:pPr marL="0" indent="0" algn="ctr" eaLnBrk="1" hangingPunct="1">
-              <a:buFont typeface="Arial" charset="0"/>
-              <a:buNone/>
-            </a:pPr>
-            <a:r>
-              <a:rPr lang="en-US" smtClean="0">
-                <a:solidFill>
-                  <a:srgbClr val="898989"/>
-                </a:solidFill>
-              </a:rPr>
-              <a:t>Aspose.Slides 2</a:t>
-            </a:r>
-          </a:p>
-          <a:p>
-            <a:pPr marL="0" indent="0" algn="ctr" eaLnBrk="1" hangingPunct="1">
-              <a:buFont typeface="Arial" charset="0"/>
-              <a:buNone/>
-            </a:pPr>
-            <a:r>
-              <a:rPr lang="en-US" smtClean="0">
-                <a:solidFill>
-                  <a:srgbClr val="898989"/>
-                </a:solidFill>
-              </a:rPr>
-              <a:t>Sample text 1</a:t>
-            </a:r>
-          </a:p>
-          <a:p>
-            <a:pPr marL="0" indent="0" algn="ctr" eaLnBrk="1" hangingPunct="1">
-              <a:buFont typeface="Arial" charset="0"/>
-              <a:buNone/>
-            </a:pPr>
-            <a:r>
-              <a:rPr lang="en-US" smtClean="0">
-                <a:solidFill>
-                  <a:srgbClr val="898989"/>
-                </a:solidFill>
-              </a:rPr>
-              <a:t>Sample text 2</a:t>
-            </a:r>
-          </a:p>
-          <a:p>
-            <a:pPr marL="0" indent="0" algn="ctr" eaLnBrk="1" hangingPunct="1">
-              <a:buFont typeface="Arial" charset="0"/>
-              <a:buNone/>
-            </a:pPr>
-            <a:endParaRPr lang="en-US" smtClean="0">
-              <a:solidFill>
-                <a:srgbClr val="898989"/>
-              </a:solidFill>
-            </a:endParaRPr>
-          </a:p>
-        </p:txBody>
-      </p:sp>
-      <p:sp>
-        <p:nvSpPr>
-          <p:cNvPr id="4" name="Rectangle 3" descr="Shape1"/>
-          <p:cNvSpPr/>
-          <p:nvPr/>
-        </p:nvSpPr>
-        <p:spPr>
-          <a:xfrm>
-            <a:off x="2057400" y="762000"/>
-            <a:ext cx="1524000" cy="990600"/>
-          </a:xfrm>
-          <a:prstGeom prst="rect">
-            <a:avLst/>
-          </a:prstGeom>
-          <a:ln w="25400" cap="flat" algn="ctr">
-            <a:prstDash val="solid"/>
-          </a:ln>
-        </p:spPr>
-        <p:style>
-          <a:lnRef idx="2">
-            <a:schemeClr val="accent1">
-              <a:shade val="50000"/>
-            </a:schemeClr>
-          </a:lnRef>
-          <a:fillRef idx="1">
-            <a:schemeClr val="accent1"/>
-          </a:fillRef>
-          <a:effectRef idx="0">
-            <a:schemeClr val="accent1"/>
-          </a:effectRef>
-          <a:fontRef idx="minor">
-            <a:schemeClr val="lt1"/>
-          </a:fontRef>
-        </p:style>
-        <p:txBody>
-          <a:bodyPr anchor="ctr"/>
-          <a:lstStyle>
-            <a:defPPr>
-              <a:defRPr lang="en-US"/>
-            </a:defPPr>
-            <a:lvl1pPr marL="0" marR="0" indent="0" algn="l" defTabSz="914400" rtl="0" eaLnBrk="0" fontAlgn="base" latinLnBrk="0" hangingPunct="1">
-              <a:lnSpc>
-                <a:spcPct val="100000"/>
-              </a:lnSpc>
-              <a:spcBef>
-                <a:spcPct val="0"/>
-              </a:spcBef>
-              <a:spcAft>
-                <a:spcPct val="0"/>
-              </a:spcAft>
-              <a:buClrTx/>
-              <a:buSzTx/>
-              <a:buFontTx/>
-              <a:buNone/>
-              <a:defRPr kumimoji="0" sz="1800" b="0" i="0" u="none" strike="noStrike" kern="1200" cap="none" spc="0" normalizeH="0" baseline="0" noProof="0">
-                <a:solidFill>
-                  <a:srgbClr val="FFFFFF"/>
-                </a:solidFill>
-                <a:uLnTx/>
-                <a:uFillTx/>
-                <a:latin typeface="Calibri"/>
-                <a:ea typeface=""/>
-                <a:cs typeface="+mn-cs"/>
-                <a:sym typeface="Wingdings"/>
-              </a:defRPr>
-            </a:lvl1pPr>
-            <a:lvl2pPr marL="457200" marR="0" indent="0" algn="l" defTabSz="914400" rtl="0" eaLnBrk="0" fontAlgn="base" latinLnBrk="0" hangingPunct="1">
-              <a:lnSpc>
-                <a:spcPct val="100000"/>
-              </a:lnSpc>
-              <a:spcBef>
-                <a:spcPct val="0"/>
-              </a:spcBef>
-              <a:spcAft>
-                <a:spcPct val="0"/>
-              </a:spcAft>
-              <a:buClrTx/>
-              <a:buSzTx/>
-              <a:buFontTx/>
-              <a:buNone/>
-              <a:defRPr kumimoji="0" sz="1800" b="0" i="0" u="none" strike="noStrike" kern="1200" cap="none" spc="0" normalizeH="0" baseline="0" noProof="0">
-                <a:solidFill>
-                  <a:srgbClr val="FFFFFF"/>
-                </a:solidFill>
-                <a:uLnTx/>
-                <a:uFillTx/>
-                <a:latin typeface="Calibri"/>
-                <a:ea typeface=""/>
-                <a:cs typeface="+mn-cs"/>
-                <a:sym typeface="Wingdings"/>
-              </a:defRPr>
-            </a:lvl2pPr>
-            <a:lvl3pPr marL="914400" marR="0" indent="0" algn="l" defTabSz="914400" rtl="0" eaLnBrk="0" fontAlgn="base" latinLnBrk="0" hangingPunct="1">
-              <a:lnSpc>
-                <a:spcPct val="100000"/>
-              </a:lnSpc>
-              <a:spcBef>
-                <a:spcPct val="0"/>
-              </a:spcBef>
-              <a:spcAft>
-                <a:spcPct val="0"/>
-              </a:spcAft>
-              <a:buClrTx/>
-              <a:buSzTx/>
-              <a:buFontTx/>
-              <a:buNone/>
-              <a:defRPr kumimoji="0" sz="1800" b="0" i="0" u="none" strike="noStrike" kern="1200" cap="none" spc="0" normalizeH="0" baseline="0" noProof="0">
-                <a:solidFill>
-                  <a:srgbClr val="FFFFFF"/>
-                </a:solidFill>
-                <a:uLnTx/>
-                <a:uFillTx/>
-                <a:latin typeface="Calibri"/>
-                <a:ea typeface=""/>
-                <a:cs typeface="+mn-cs"/>
-                <a:sym typeface="Wingdings"/>
-              </a:defRPr>
-            </a:lvl3pPr>
-            <a:lvl4pPr marL="1371600" marR="0" indent="0" algn="l" defTabSz="914400" rtl="0" eaLnBrk="0" fontAlgn="base" latinLnBrk="0" hangingPunct="1">
-              <a:lnSpc>
-                <a:spcPct val="100000"/>
-              </a:lnSpc>
-              <a:spcBef>
-                <a:spcPct val="0"/>
-              </a:spcBef>
-              <a:spcAft>
-                <a:spcPct val="0"/>
-              </a:spcAft>
-              <a:buClrTx/>
-              <a:buSzTx/>
-              <a:buFontTx/>
-              <a:buNone/>
-              <a:defRPr kumimoji="0" sz="1800" b="0" i="0" u="none" strike="noStrike" kern="1200" cap="none" spc="0" normalizeH="0" baseline="0" noProof="0">
-                <a:solidFill>
-                  <a:srgbClr val="FFFFFF"/>
-                </a:solidFill>
-                <a:uLnTx/>
-                <a:uFillTx/>
-                <a:latin typeface="Calibri"/>
-                <a:ea typeface=""/>
-                <a:cs typeface="+mn-cs"/>
-                <a:sym typeface="Wingdings"/>
-              </a:defRPr>
-            </a:lvl4pPr>
-            <a:lvl5pPr marL="1828800" marR="0" indent="0" algn="l" defTabSz="914400" rtl="0" eaLnBrk="0" fontAlgn="base" latinLnBrk="0" hangingPunct="1">
-              <a:lnSpc>
-                <a:spcPct val="100000"/>
-              </a:lnSpc>
-              <a:spcBef>
-                <a:spcPct val="0"/>
-              </a:spcBef>
-              <a:spcAft>
-                <a:spcPct val="0"/>
-              </a:spcAft>
-              <a:buClrTx/>
-              <a:buSzTx/>
-              <a:buFontTx/>
-              <a:buNone/>
-              <a:defRPr kumimoji="0" sz="1800" b="0" i="0" u="none" strike="noStrike" kern="1200" cap="none" spc="0" normalizeH="0" baseline="0" noProof="0">
-                <a:solidFill>
-                  <a:srgbClr val="FFFFFF"/>
-                </a:solidFill>
-                <a:uLnTx/>
-                <a:uFillTx/>
-                <a:latin typeface="Calibri"/>
-                <a:ea typeface=""/>
-                <a:cs typeface="+mn-cs"/>
-                <a:sym typeface="Wingdings"/>
-              </a:defRPr>
-            </a:lvl5pPr>
-            <a:lvl6pPr marL="2286000" marR="0" indent="0" algn="l" defTabSz="914400" rtl="0" eaLnBrk="1" fontAlgn="auto" latinLnBrk="0" hangingPunct="1">
-              <a:lnSpc>
-                <a:spcPct val="100000"/>
-              </a:lnSpc>
-              <a:spcBef>
-                <a:spcPct val="0"/>
-              </a:spcBef>
-              <a:spcAft>
-                <a:spcPct val="0"/>
-              </a:spcAft>
-              <a:buClrTx/>
-              <a:buSzTx/>
-              <a:buFontTx/>
-              <a:buNone/>
-              <a:defRPr kumimoji="0" sz="1800" b="0" i="0" u="none" strike="noStrike" kern="1200" cap="none" spc="0" normalizeH="0" baseline="0" noProof="0">
-                <a:solidFill>
-                  <a:srgbClr val="FFFFFF"/>
-                </a:solidFill>
-                <a:uLnTx/>
-                <a:uFillTx/>
-                <a:latin typeface="Calibri"/>
-                <a:ea typeface=""/>
-                <a:cs typeface="+mn-cs"/>
-                <a:sym typeface="Wingdings"/>
-              </a:defRPr>
-            </a:lvl6pPr>
-            <a:lvl7pPr marL="2743200" marR="0" indent="0" algn="l" defTabSz="914400" rtl="0" eaLnBrk="1" fontAlgn="auto" latinLnBrk="0" hangingPunct="1">
-              <a:lnSpc>
-                <a:spcPct val="100000"/>
-              </a:lnSpc>
-              <a:spcBef>
-                <a:spcPct val="0"/>
-              </a:spcBef>
-              <a:spcAft>
-                <a:spcPct val="0"/>
-              </a:spcAft>
-              <a:buClrTx/>
-              <a:buSzTx/>
-              <a:buFontTx/>
-              <a:buNone/>
-              <a:defRPr kumimoji="0" sz="1800" b="0" i="0" u="none" strike="noStrike" kern="1200" cap="none" spc="0" normalizeH="0" baseline="0" noProof="0">
-                <a:solidFill>
-                  <a:srgbClr val="FFFFFF"/>
-                </a:solidFill>
-                <a:uLnTx/>
-                <a:uFillTx/>
-                <a:latin typeface="Calibri"/>
-                <a:ea typeface=""/>
-                <a:cs typeface="+mn-cs"/>
-                <a:sym typeface="Wingdings"/>
-              </a:defRPr>
-            </a:lvl7pPr>
-            <a:lvl8pPr marL="3200400" marR="0" indent="0" algn="l" defTabSz="914400" rtl="0" eaLnBrk="1" fontAlgn="auto" latinLnBrk="0" hangingPunct="1">
-              <a:lnSpc>
-                <a:spcPct val="100000"/>
-              </a:lnSpc>
-              <a:spcBef>
-                <a:spcPct val="0"/>
-              </a:spcBef>
-              <a:spcAft>
-                <a:spcPct val="0"/>
-              </a:spcAft>
-              <a:buClrTx/>
-              <a:buSzTx/>
-              <a:buFontTx/>
-              <a:buNone/>
-              <a:defRPr kumimoji="0" sz="1800" b="0" i="0" u="none" strike="noStrike" kern="1200" cap="none" spc="0" normalizeH="0" baseline="0" noProof="0">
-                <a:solidFill>
-                  <a:srgbClr val="FFFFFF"/>
-                </a:solidFill>
-                <a:uLnTx/>
-                <a:uFillTx/>
-                <a:latin typeface="Calibri"/>
-                <a:ea typeface=""/>
-                <a:cs typeface="+mn-cs"/>
-                <a:sym typeface="Wingdings"/>
-              </a:defRPr>
-            </a:lvl8pPr>
-            <a:lvl9pPr marL="3657600" marR="0" indent="0" algn="l" defTabSz="914400" rtl="0" eaLnBrk="1" fontAlgn="auto" latinLnBrk="0" hangingPunct="1">
-              <a:lnSpc>
-                <a:spcPct val="100000"/>
-              </a:lnSpc>
-              <a:spcBef>
-                <a:spcPct val="0"/>
-              </a:spcBef>
-              <a:spcAft>
-                <a:spcPct val="0"/>
-              </a:spcAft>
-              <a:buClrTx/>
-              <a:buSzTx/>
-              <a:buFontTx/>
-              <a:buNone/>
-              <a:defRPr kumimoji="0" sz="1800" b="0" i="0" u="none" strike="noStrike" kern="1200" cap="none" spc="0" normalizeH="0" baseline="0" noProof="0">
-                <a:solidFill>
-                  <a:srgbClr val="FFFFFF"/>
-                </a:solidFill>
-                <a:uLnTx/>
-                <a:uFillTx/>
-                <a:latin typeface="Calibri"/>
-                <a:ea typeface=""/>
-                <a:cs typeface="+mn-cs"/>
-                <a:sym typeface="Wingdings"/>
-              </a:defRPr>
-            </a:lvl9pPr>
-          </a:lstStyle>
-          <a:p>
-            <a:pPr algn="ctr" fontAlgn="auto">
-              <a:defRPr/>
-            </a:pPr>
-            <a:endParaRPr lang="en-US"/>
-          </a:p>
-        </p:txBody>
-      </p:sp>
-      <p:cxnSp>
-        <p:nvCxnSpPr>
-          <p:cNvPr id="6" name="Elbow Connector 5"/>
-          <p:cNvCxnSpPr/>
-          <p:nvPr/>
-        </p:nvCxnSpPr>
-        <p:spPr>
-          <a:xfrm>
-            <a:off x="3810000" y="1219200"/>
-            <a:ext cx="1447800" cy="1066800"/>
-          </a:xfrm>
-          <a:prstGeom prst="bentConnector3">
-            <a:avLst>
-              <a:gd name="adj1" fmla="val 50000"/>
-            </a:avLst>
-          </a:prstGeom>
-          <a:ln w="9525" cap="flat" algn="ctr">
-            <a:solidFill>
-              <a:srgbClr val="FF0000"/>
-            </a:solidFill>
-            <a:prstDash val="solid"/>
-            <a:tailEnd type="arrow"/>
-          </a:ln>
-          <a:effectLst>
-            <a:reflection blurRad="6350" stA="50000" endA="300" endPos="55000" dir="5400000" sy="-100000" algn="bl" rotWithShape="0"/>
-          </a:effectLst>
-        </p:spPr>
-        <p:style>
-          <a:lnRef idx="1">
-            <a:schemeClr val="accent1"/>
-          </a:lnRef>
-          <a:fillRef idx="0">
-            <a:schemeClr val="accent1"/>
-          </a:fillRef>
-          <a:effectRef idx="0">
-            <a:schemeClr val="accent1"/>
-          </a:effectRef>
-          <a:fontRef idx="minor">
-            <a:schemeClr val="tx1"/>
-          </a:fontRef>
-        </p:style>
-      </p:cxnSp>
     </p:spTree>
   </p:cSld>
   <p:clrMapOvr>
     <a:masterClrMapping/>
   </p:clrMapOvr>
-  <p:timing>
-    <p:tnLst>
-      <p:par>
-        <p:cTn id="1" dur="indefinite" restart="never" nodeType="tmRoot"/>
-      </p:par>
-    </p:tnLst>
-  </p:timing>
-</p:sld>
-</file>
-
-<file path=ppt/slides/slide3.xml><?xml version="1.0" encoding="utf-8"?>
-<p:sld xmlns:a="http://schemas.openxmlformats.org/drawingml/2006/main" xmlns:r="http://schemas.openxmlformats.org/officeDocument/2006/relationships" xmlns:p="http://schemas.openxmlformats.org/presentationml/2006/main">
-  <p:cSld>
-    <p:spTree>
-      <p:nvGrpSpPr>
-        <p:cNvPr id="1" name=""/>
-        <p:cNvGrpSpPr/>
-        <p:nvPr/>
-      </p:nvGrpSpPr>
-      <p:grpSpPr>
-        <a:xfrm>
-          <a:off x="0" y="0"/>
-          <a:ext cx="0" cy="0"/>
-          <a:chOff x="0" y="0"/>
-          <a:chExt cx="0" cy="0"/>
-        </a:xfrm>
-      </p:grpSpPr>
-      <p:sp>
-        <p:nvSpPr>
-          <p:cNvPr id="39937" name="Title 1"/>
-          <p:cNvSpPr>
-            <a:spLocks noGrp="1"/>
-          </p:cNvSpPr>
-          <p:nvPr>
-            <p:ph type="ctrTitle"/>
-          </p:nvPr>
-        </p:nvSpPr>
-        <p:spPr/>
-        <p:txBody>
-          <a:bodyPr/>
-          <a:lstStyle/>
-          <a:p>
-            <a:pPr eaLnBrk="1" hangingPunct="1"/>
-            <a:r>
-              <a:rPr lang="en-US" smtClean="0"/>
-              <a:t>Aspose.Slides for Java</a:t>
-            </a:r>
-          </a:p>
-        </p:txBody>
-      </p:sp>
-      <p:sp>
-        <p:nvSpPr>
-          <p:cNvPr id="39938" name="Subtitle 2"/>
-          <p:cNvSpPr>
-            <a:spLocks noGrp="1"/>
-          </p:cNvSpPr>
-          <p:nvPr>
-            <p:ph type="subTitle" idx="1"/>
-          </p:nvPr>
-        </p:nvSpPr>
-        <p:spPr/>
-        <p:txBody>
-          <a:bodyPr/>
-          <a:lstStyle/>
-          <a:p>
-            <a:pPr eaLnBrk="1" hangingPunct="1"/>
-            <a:r>
-              <a:rPr lang="en-US" b="1" smtClean="0">
-                <a:solidFill>
-                  <a:srgbClr val="FF0000"/>
-                </a:solidFill>
-              </a:rPr>
-              <a:t>Test File</a:t>
-            </a:r>
-          </a:p>
-        </p:txBody>
-      </p:sp>
-      <p:pic>
-        <p:nvPicPr>
-          <p:cNvPr id="39939" name="Picture 3" descr="aspose-logo.jpg"/>
-          <p:cNvPicPr>
-            <a:picLocks noChangeAspect="1"/>
-          </p:cNvPicPr>
-          <p:nvPr/>
-        </p:nvPicPr>
-        <p:blipFill>
-          <a:blip r:embed="rId2"/>
-          <a:srcRect/>
-          <a:stretch>
-            <a:fillRect/>
-          </a:stretch>
-        </p:blipFill>
-        <p:spPr bwMode="auto">
-          <a:xfrm>
-            <a:off x="3643313" y="3167063"/>
-            <a:ext cx="1857375" cy="523875"/>
-          </a:xfrm>
-          <a:prstGeom prst="rect">
-            <a:avLst/>
-          </a:prstGeom>
-          <a:noFill/>
-          <a:ln w="9525">
-            <a:noFill/>
-            <a:miter lim="800000"/>
-            <a:headEnd/>
-            <a:tailEnd/>
-          </a:ln>
-        </p:spPr>
-      </p:pic>
-    </p:spTree>
-  </p:cSld>
-  <p:clrMapOvr>
-    <a:masterClrMapping/>
-  </p:clrMapOvr>
-  <p:timing>
-    <p:tnLst>
-      <p:par>
-        <p:cTn id="1" dur="indefinite" restart="never" nodeType="tmRoot"/>
-      </p:par>
-    </p:tnLst>
-  </p:timing>
+  <p:transition/>
+  <p:timing/>
 </p:sld>
 </file>
 
 <file path=ppt/tags/tag1.xml><?xml version="1.0" encoding="utf-8"?>
-<p:tagLst xmlns:a="http://schemas.openxmlformats.org/drawingml/2006/main" xmlns:r="http://schemas.openxmlformats.org/officeDocument/2006/relationships" xmlns:p="http://schemas.openxmlformats.org/presentationml/2006/main">
-  <p:tag name="AS_NET" val="4.0.30319.18408"/>
+<p:tagLst xmlns:p="http://schemas.openxmlformats.org/presentationml/2006/main">
+  <p:tag name="AS_NET" val="4.0.30319.36366"/>
   <p:tag name="AS_OS" val="Microsoft Windows NT 6.2.9200.0"/>
-  <p:tag name="AS_RELEASE_DATE" val="2014.05.30"/>
-  <p:tag name="AS_TITLE" val="Aspose.Slides for .NET 2.0"/>
-  <p:tag name="AS_VERSION" val="8.4.2.0"/>
+  <p:tag name="AS_RELEASE_DATE" val="2016.08.03"/>
+  <p:tag name="AS_TITLE" val="Aspose.Slides for .NET 4.0"/>
+  <p:tag name="AS_VERSION" val="16.7.0.0"/>
 </p:tagLst>
 </file>
 
 <file path=ppt/theme/theme1.xml><?xml version="1.0" encoding="utf-8"?>
-<a:theme xmlns:a="http://schemas.openxmlformats.org/drawingml/2006/main" name="Office Theme">
+<a:theme xmlns:r="http://schemas.openxmlformats.org/officeDocument/2006/relationships" xmlns:a="http://schemas.openxmlformats.org/drawingml/2006/main" name="Office Theme">
   <a:themeElements>
     <a:clrScheme name="Office">
       <a:dk1>
@@ -11823,8 +10871,8 @@
     <a:fontScheme name="Office">
       <a:majorFont>
         <a:latin typeface="Calibri"/>
-        <a:ea typeface=""/>
-        <a:cs typeface=""/>
+        <a:ea typeface="Arial"/>
+        <a:cs typeface="Arial"/>
         <a:font script="Uigh" typeface="Microsoft Uighur"/>
         <a:font script="Beng" typeface="Vrinda"/>
         <a:font script="Thai" typeface="Angsana New"/>
@@ -11857,8 +10905,8 @@
       </a:majorFont>
       <a:minorFont>
         <a:latin typeface="Calibri"/>
-        <a:ea typeface=""/>
-        <a:cs typeface=""/>
+        <a:ea typeface="Arial"/>
+        <a:cs typeface="Arial"/>
         <a:font script="Uigh" typeface="Microsoft Uighur"/>
         <a:font script="Beng" typeface="Vrinda"/>
         <a:font script="Thai" typeface="Cordia New"/>
@@ -11917,7 +10965,6 @@
             </a:gs>
           </a:gsLst>
           <a:lin ang="16200000" scaled="1"/>
-          <a:tileRect/>
         </a:gradFill>
         <a:gradFill rotWithShape="1">
           <a:gsLst>
@@ -11941,7 +10988,6 @@
             </a:gs>
           </a:gsLst>
           <a:lin ang="16200000" scaled="0"/>
-          <a:tileRect/>
         </a:gradFill>
       </a:fillStyleLst>
       <a:lnStyleLst>
@@ -12033,8 +11079,9 @@
               </a:schemeClr>
             </a:gs>
           </a:gsLst>
-          <a:path path="circle"/>
-          <a:tileRect/>
+          <a:path path="circle">
+            <a:fillToRect/>
+          </a:path>
         </a:gradFill>
         <a:gradFill rotWithShape="1">
           <a:gsLst>
@@ -12054,18 +11101,16 @@
           <a:path path="circle">
             <a:fillToRect l="50000" t="50000" r="50000" b="50000"/>
           </a:path>
-          <a:tileRect/>
         </a:gradFill>
       </a:bgFillStyleLst>
     </a:fmtScheme>
   </a:themeElements>
   <a:objectDefaults/>
-  <a:extraClrSchemeLst/>
 </a:theme>
 </file>
 
 <file path=ppt/theme/theme2.xml><?xml version="1.0" encoding="utf-8"?>
-<a:theme xmlns:a="http://schemas.openxmlformats.org/drawingml/2006/main" name="Office Theme">
+<a:theme xmlns:r="http://schemas.openxmlformats.org/officeDocument/2006/relationships" xmlns:a="http://schemas.openxmlformats.org/drawingml/2006/main" name="Office Theme">
   <a:themeElements>
     <a:clrScheme name="Office">
       <a:dk1>
@@ -12108,8 +11153,8 @@
     <a:fontScheme name="Office">
       <a:majorFont>
         <a:latin typeface="Calibri"/>
-        <a:ea typeface=""/>
-        <a:cs typeface=""/>
+        <a:ea typeface="Arial"/>
+        <a:cs typeface="Arial"/>
         <a:font script="Uigh" typeface="Microsoft Uighur"/>
         <a:font script="Beng" typeface="Vrinda"/>
         <a:font script="Thai" typeface="Angsana New"/>
@@ -12143,8 +11188,8 @@
       </a:majorFont>
       <a:minorFont>
         <a:latin typeface="Calibri"/>
-        <a:ea typeface=""/>
-        <a:cs typeface=""/>
+        <a:ea typeface="Arial"/>
+        <a:cs typeface="Arial"/>
         <a:font script="Uigh" typeface="Microsoft Uighur"/>
         <a:font script="Beng" typeface="Vrinda"/>
         <a:font script="Thai" typeface="Cordia New"/>
@@ -12204,7 +11249,6 @@
             </a:gs>
           </a:gsLst>
           <a:lin ang="16200000" scaled="1"/>
-          <a:tileRect/>
         </a:gradFill>
         <a:gradFill rotWithShape="1">
           <a:gsLst>
@@ -12228,7 +11272,6 @@
             </a:gs>
           </a:gsLst>
           <a:lin ang="16200000" scaled="0"/>
-          <a:tileRect/>
         </a:gradFill>
       </a:fillStyleLst>
       <a:lnStyleLst>
@@ -12320,8 +11363,9 @@
               </a:schemeClr>
             </a:gs>
           </a:gsLst>
-          <a:path path="circle"/>
-          <a:tileRect/>
+          <a:path path="circle">
+            <a:fillToRect/>
+          </a:path>
         </a:gradFill>
         <a:gradFill rotWithShape="1">
           <a:gsLst>
@@ -12341,18 +11385,16 @@
           <a:path path="circle">
             <a:fillToRect l="50000" t="50000" r="50000" b="50000"/>
           </a:path>
-          <a:tileRect/>
         </a:gradFill>
       </a:bgFillStyleLst>
     </a:fmtScheme>
   </a:themeElements>
   <a:objectDefaults/>
-  <a:extraClrSchemeLst/>
 </a:theme>
 </file>
 
 <file path=ppt/theme/theme3.xml><?xml version="1.0" encoding="utf-8"?>
-<a:theme xmlns:a="http://schemas.openxmlformats.org/drawingml/2006/main" name="Office Theme">
+<a:theme xmlns:r="http://schemas.openxmlformats.org/officeDocument/2006/relationships" xmlns:a="http://schemas.openxmlformats.org/drawingml/2006/main" name="Office Theme">
   <a:themeElements>
     <a:clrScheme name="Office">
       <a:dk1>
@@ -12395,8 +11437,8 @@
     <a:fontScheme name="Office">
       <a:majorFont>
         <a:latin typeface="Calibri"/>
-        <a:ea typeface=""/>
-        <a:cs typeface=""/>
+        <a:ea typeface="Arial"/>
+        <a:cs typeface="Arial"/>
         <a:font script="Uigh" typeface="Microsoft Uighur"/>
         <a:font script="Beng" typeface="Vrinda"/>
         <a:font script="Thai" typeface="Angsana New"/>
@@ -12429,8 +11471,8 @@
       </a:majorFont>
       <a:minorFont>
         <a:latin typeface="Calibri"/>
-        <a:ea typeface=""/>
-        <a:cs typeface=""/>
+        <a:ea typeface="Arial"/>
+        <a:cs typeface="Arial"/>
         <a:font script="Uigh" typeface="Microsoft Uighur"/>
         <a:font script="Beng" typeface="Vrinda"/>
         <a:font script="Thai" typeface="Cordia New"/>
@@ -12489,7 +11531,6 @@
             </a:gs>
           </a:gsLst>
           <a:lin ang="16200000" scaled="1"/>
-          <a:tileRect/>
         </a:gradFill>
         <a:gradFill rotWithShape="1">
           <a:gsLst>
@@ -12513,7 +11554,6 @@
             </a:gs>
           </a:gsLst>
           <a:lin ang="16200000" scaled="0"/>
-          <a:tileRect/>
         </a:gradFill>
       </a:fillStyleLst>
       <a:lnStyleLst>
@@ -12605,8 +11645,9 @@
               </a:schemeClr>
             </a:gs>
           </a:gsLst>
-          <a:path path="circle"/>
-          <a:tileRect/>
+          <a:path path="circle">
+            <a:fillToRect/>
+          </a:path>
         </a:gradFill>
         <a:gradFill rotWithShape="1">
           <a:gsLst>
@@ -12626,12 +11667,10 @@
           <a:path path="circle">
             <a:fillToRect l="50000" t="50000" r="50000" b="50000"/>
           </a:path>
-          <a:tileRect/>
         </a:gradFill>
       </a:bgFillStyleLst>
     </a:fmtScheme>
   </a:themeElements>
   <a:objectDefaults/>
-  <a:extraClrSchemeLst/>
 </a:theme>
 </file>
</xml_diff>